<commit_message>
pp en project update
</commit_message>
<xml_diff>
--- a/Headless CMS.pptx
+++ b/Headless CMS.pptx
@@ -6198,8 +6198,12 @@
             <a:buChar char="•"/>
           </a:pPr>
           <a:r>
-            <a:rPr lang="nl-BE"/>
-            <a:t>Gets frequent updates</a:t>
+            <a:rPr lang="nl-BE" dirty="0" err="1"/>
+            <a:t>Gets</a:t>
+          </a:r>
+          <a:r>
+            <a:rPr lang="nl-BE" dirty="0"/>
+            <a:t> frequent updates</a:t>
           </a:r>
         </a:p>
       </dgm:t>
@@ -6323,8 +6327,16 @@
             <a:buChar char="•"/>
           </a:pPr>
           <a:r>
-            <a:rPr lang="nl-BE"/>
-            <a:t>user friendly interface</a:t>
+            <a:rPr lang="nl-BE" dirty="0"/>
+            <a:t>user </a:t>
+          </a:r>
+          <a:r>
+            <a:rPr lang="nl-BE" dirty="0" err="1"/>
+            <a:t>friendly</a:t>
+          </a:r>
+          <a:r>
+            <a:rPr lang="nl-BE" dirty="0"/>
+            <a:t> interface</a:t>
           </a:r>
         </a:p>
       </dgm:t>
@@ -6341,50 +6353,6 @@
       </dgm:t>
     </dgm:pt>
     <dgm:pt modelId="{B67BFF3B-2254-4140-860B-3D423E67906F}" type="sibTrans" cxnId="{62A93AD5-4D62-4519-9827-CEFBAB1DBDE7}">
-      <dgm:prSet/>
-      <dgm:spPr/>
-      <dgm:t>
-        <a:bodyPr/>
-        <a:lstStyle/>
-        <a:p>
-          <a:endParaRPr lang="nl-BE"/>
-        </a:p>
-      </dgm:t>
-    </dgm:pt>
-    <dgm:pt modelId="{9BFD493E-13D4-4D3D-BDA6-F7C3927D6262}">
-      <dgm:prSet/>
-      <dgm:spPr/>
-      <dgm:t>
-        <a:bodyPr/>
-        <a:lstStyle/>
-        <a:p>
-          <a:pPr>
-            <a:buFont typeface="Arial" panose="020B0604020202020204" pitchFamily="34" charset="0"/>
-            <a:buChar char="•"/>
-          </a:pPr>
-          <a:r>
-            <a:rPr lang="nl-BE" b="0" dirty="0"/>
-            <a:t>Enterprise Trial </a:t>
-          </a:r>
-          <a:r>
-            <a:rPr lang="nl-BE" dirty="0"/>
-            <a:t>aanvragen</a:t>
-          </a:r>
-        </a:p>
-      </dgm:t>
-    </dgm:pt>
-    <dgm:pt modelId="{2DC752A5-8AFF-4754-865B-36DA6C6C526E}" type="parTrans" cxnId="{BA55864C-D03A-4027-BD95-7E8BCC1EF64F}">
-      <dgm:prSet/>
-      <dgm:spPr/>
-      <dgm:t>
-        <a:bodyPr/>
-        <a:lstStyle/>
-        <a:p>
-          <a:endParaRPr lang="nl-BE"/>
-        </a:p>
-      </dgm:t>
-    </dgm:pt>
-    <dgm:pt modelId="{4A0B7227-89F9-4C55-A430-BAD28EF8A35C}" type="sibTrans" cxnId="{BA55864C-D03A-4027-BD95-7E8BCC1EF64F}">
       <dgm:prSet/>
       <dgm:spPr/>
       <dgm:t>
@@ -6522,7 +6490,7 @@
         </a:p>
       </dgm:t>
     </dgm:pt>
-    <dgm:pt modelId="{394D31EA-B579-4487-8CD7-0D3E620EF352}">
+    <dgm:pt modelId="{067411F9-3661-4930-8F97-5A9AFB1272ED}">
       <dgm:prSet/>
       <dgm:spPr/>
       <dgm:t>
@@ -6534,89 +6502,45 @@
             <a:buChar char="•"/>
           </a:pPr>
           <a:r>
-            <a:rPr lang="nl-BE" dirty="0" err="1"/>
-            <a:t>Not</a:t>
+            <a:rPr lang="nl-BE" dirty="0"/>
+            <a:t>easy Quick start</a:t>
           </a:r>
-          <a:r>
-            <a:rPr lang="nl-BE" dirty="0"/>
-            <a:t> easy Quick start</a:t>
-          </a:r>
         </a:p>
       </dgm:t>
     </dgm:pt>
-    <dgm:pt modelId="{115D081D-5486-445D-8886-67447670ECB6}" type="parTrans" cxnId="{FE146B06-8899-408B-9836-EB79D3DB7D9B}">
+    <dgm:pt modelId="{C0E1D380-59ED-422E-B18D-8F3D87B53EFA}" type="parTrans" cxnId="{C054E776-4CF6-44AC-B82A-37523D7E87E9}">
+      <dgm:prSet/>
+      <dgm:spPr/>
+    </dgm:pt>
+    <dgm:pt modelId="{4BC83F5A-18B4-4AA9-94E6-0A631F4730D9}" type="sibTrans" cxnId="{C054E776-4CF6-44AC-B82A-37523D7E87E9}">
+      <dgm:prSet/>
+      <dgm:spPr/>
+    </dgm:pt>
+    <dgm:pt modelId="{30062BC1-47A3-4C6E-96DE-5B75A5D36A28}">
       <dgm:prSet/>
       <dgm:spPr/>
       <dgm:t>
         <a:bodyPr/>
         <a:lstStyle/>
         <a:p>
-          <a:endParaRPr lang="nl-BE"/>
-        </a:p>
-      </dgm:t>
-    </dgm:pt>
-    <dgm:pt modelId="{FA033EB6-E997-455E-A5D4-AFA9C5284F4F}" type="sibTrans" cxnId="{FE146B06-8899-408B-9836-EB79D3DB7D9B}">
-      <dgm:prSet/>
-      <dgm:spPr/>
-      <dgm:t>
-        <a:bodyPr/>
-        <a:lstStyle/>
-        <a:p>
-          <a:endParaRPr lang="nl-BE"/>
-        </a:p>
-      </dgm:t>
-    </dgm:pt>
-    <dgm:pt modelId="{697556C2-60A4-4C9E-AC37-9D0A89B26788}">
-      <dgm:prSet/>
-      <dgm:spPr/>
-      <dgm:t>
-        <a:bodyPr/>
-        <a:lstStyle/>
-        <a:p>
           <a:pPr>
             <a:buFont typeface="Arial" panose="020B0604020202020204" pitchFamily="34" charset="0"/>
             <a:buChar char="•"/>
           </a:pPr>
           <a:r>
-            <a:rPr lang="nl-BE" dirty="0" err="1"/>
-            <a:t>GraphQL</a:t>
+            <a:rPr lang="nl-BE" b="0" dirty="0"/>
+            <a:t>AWS hosting</a:t>
           </a:r>
-          <a:r>
-            <a:rPr lang="nl-BE" dirty="0"/>
-            <a:t> voor </a:t>
-          </a:r>
-          <a:r>
-            <a:rPr lang="nl-BE" dirty="0" err="1"/>
-            <a:t>Api</a:t>
-          </a:r>
-          <a:r>
-            <a:rPr lang="nl-BE" dirty="0"/>
-            <a:t> connectie</a:t>
-          </a:r>
         </a:p>
       </dgm:t>
     </dgm:pt>
-    <dgm:pt modelId="{6DC9AD85-F180-4396-81B6-8837AD1F2C51}" type="parTrans" cxnId="{D852C4B0-F375-4BE3-8E5C-C91E6C4CADB7}">
+    <dgm:pt modelId="{5191EDB7-5DA9-4972-B6C1-C45F741F46AB}" type="parTrans" cxnId="{25C2819E-9FD9-4FC3-88F3-BEAB16CCD51F}">
       <dgm:prSet/>
       <dgm:spPr/>
-      <dgm:t>
-        <a:bodyPr/>
-        <a:lstStyle/>
-        <a:p>
-          <a:endParaRPr lang="nl-BE"/>
-        </a:p>
-      </dgm:t>
-    </dgm:pt>
-    <dgm:pt modelId="{D20AF61E-F69B-4CC5-ABF2-EF2CAB501D7B}" type="sibTrans" cxnId="{D852C4B0-F375-4BE3-8E5C-C91E6C4CADB7}">
+    </dgm:pt>
+    <dgm:pt modelId="{3903C017-815C-4B98-8AB6-0CD73503B76B}" type="sibTrans" cxnId="{25C2819E-9FD9-4FC3-88F3-BEAB16CCD51F}">
       <dgm:prSet/>
       <dgm:spPr/>
-      <dgm:t>
-        <a:bodyPr/>
-        <a:lstStyle/>
-        <a:p>
-          <a:endParaRPr lang="nl-BE"/>
-        </a:p>
-      </dgm:t>
     </dgm:pt>
     <dgm:pt modelId="{CC30DAB4-3365-4A91-89AF-D87C9A7C6AB3}" type="pres">
       <dgm:prSet presAssocID="{5E3F3542-CAB0-4E11-B2FB-BE482BFC7A0D}" presName="Name0" presStyleCnt="0">
@@ -6678,9 +6602,6 @@
     </dgm:pt>
   </dgm:ptLst>
   <dgm:cxnLst>
-    <dgm:cxn modelId="{17DB4A03-A294-4182-BC3C-45B7B12D7BC1}" type="presOf" srcId="{697556C2-60A4-4C9E-AC37-9D0A89B26788}" destId="{A0AC98F3-17E4-4BE5-A378-BA6D3C5FB3F5}" srcOrd="0" destOrd="4" presId="urn:microsoft.com/office/officeart/2005/8/layout/hList1"/>
-    <dgm:cxn modelId="{FC9CA903-AB1E-450D-8DF8-9380AB88C3D3}" type="presOf" srcId="{394D31EA-B579-4487-8CD7-0D3E620EF352}" destId="{A0AC98F3-17E4-4BE5-A378-BA6D3C5FB3F5}" srcOrd="0" destOrd="3" presId="urn:microsoft.com/office/officeart/2005/8/layout/hList1"/>
-    <dgm:cxn modelId="{FE146B06-8899-408B-9836-EB79D3DB7D9B}" srcId="{67D5050B-C8B4-461F-BA15-B5A1B566D183}" destId="{394D31EA-B579-4487-8CD7-0D3E620EF352}" srcOrd="3" destOrd="0" parTransId="{115D081D-5486-445D-8886-67447670ECB6}" sibTransId="{FA033EB6-E997-455E-A5D4-AFA9C5284F4F}"/>
     <dgm:cxn modelId="{56946C09-6FAF-4F81-8054-D244879A888D}" srcId="{57C570E0-3C19-4230-9E6F-DBE28A51AC6F}" destId="{82800D30-D587-4546-B71C-8E871DFB43B4}" srcOrd="1" destOrd="0" parTransId="{9C63E6A3-2E90-4B63-9B19-F04355420C4B}" sibTransId="{9E4B2C5A-2915-455D-B608-689BB86C32D1}"/>
     <dgm:cxn modelId="{8F25EB17-4728-4B58-9EC9-16A51728245D}" type="presOf" srcId="{FCC2D745-ACBB-4C66-BF88-31EB1CD0B05F}" destId="{C8F60122-0708-422C-8C37-4A4DE14B071D}" srcOrd="0" destOrd="2" presId="urn:microsoft.com/office/officeart/2005/8/layout/hList1"/>
     <dgm:cxn modelId="{31D9D32C-E69A-4D32-ADCD-7928D25F9320}" srcId="{57C570E0-3C19-4230-9E6F-DBE28A51AC6F}" destId="{8EE5F130-FC8E-4D0F-9FFA-C460E4B5424C}" srcOrd="3" destOrd="0" parTransId="{20EDB603-E689-4888-AD6D-4ED0A8600642}" sibTransId="{222930F6-43D2-44CF-9387-410F29AE233A}"/>
@@ -6688,23 +6609,24 @@
     <dgm:cxn modelId="{7CDDEC45-C8A0-4148-A1B3-25BF5EB63758}" type="presOf" srcId="{61541396-6934-4074-AC69-B8662B1F68D7}" destId="{C8F60122-0708-422C-8C37-4A4DE14B071D}" srcOrd="0" destOrd="0" presId="urn:microsoft.com/office/officeart/2005/8/layout/hList1"/>
     <dgm:cxn modelId="{AAAEE466-5A41-40FE-9C91-AF32673756DC}" type="presOf" srcId="{82800D30-D587-4546-B71C-8E871DFB43B4}" destId="{C8F60122-0708-422C-8C37-4A4DE14B071D}" srcOrd="0" destOrd="1" presId="urn:microsoft.com/office/officeart/2005/8/layout/hList1"/>
     <dgm:cxn modelId="{0270CF6A-9EEE-4F35-B88D-B069AEB22759}" type="presOf" srcId="{57C570E0-3C19-4230-9E6F-DBE28A51AC6F}" destId="{4AB5D19E-6A22-4D78-ADB0-6985108FE4EF}" srcOrd="0" destOrd="0" presId="urn:microsoft.com/office/officeart/2005/8/layout/hList1"/>
-    <dgm:cxn modelId="{BA55864C-D03A-4027-BD95-7E8BCC1EF64F}" srcId="{57C570E0-3C19-4230-9E6F-DBE28A51AC6F}" destId="{9BFD493E-13D4-4D3D-BDA6-F7C3927D6262}" srcOrd="5" destOrd="0" parTransId="{2DC752A5-8AFF-4754-865B-36DA6C6C526E}" sibTransId="{4A0B7227-89F9-4C55-A430-BAD28EF8A35C}"/>
     <dgm:cxn modelId="{A3460674-ED09-4194-99B7-2E8E851FB291}" type="presOf" srcId="{2D0D16FC-F44D-44BC-98D9-7F25A9F363CD}" destId="{A0AC98F3-17E4-4BE5-A378-BA6D3C5FB3F5}" srcOrd="0" destOrd="1" presId="urn:microsoft.com/office/officeart/2005/8/layout/hList1"/>
     <dgm:cxn modelId="{128BBA74-72C2-435C-923A-2541A7FC194A}" srcId="{5E3F3542-CAB0-4E11-B2FB-BE482BFC7A0D}" destId="{57C570E0-3C19-4230-9E6F-DBE28A51AC6F}" srcOrd="0" destOrd="0" parTransId="{FDAB65A9-4017-4C0C-A15F-799A5BC91462}" sibTransId="{43EBE2EC-0CDF-40FD-8FC6-D7C226777F7D}"/>
+    <dgm:cxn modelId="{C054E776-4CF6-44AC-B82A-37523D7E87E9}" srcId="{57C570E0-3C19-4230-9E6F-DBE28A51AC6F}" destId="{067411F9-3661-4930-8F97-5A9AFB1272ED}" srcOrd="6" destOrd="0" parTransId="{C0E1D380-59ED-422E-B18D-8F3D87B53EFA}" sibTransId="{4BC83F5A-18B4-4AA9-94E6-0A631F4730D9}"/>
     <dgm:cxn modelId="{E912227A-01F2-4AB4-96B5-E231EEEF10BB}" type="presOf" srcId="{5E3F3542-CAB0-4E11-B2FB-BE482BFC7A0D}" destId="{CC30DAB4-3365-4A91-89AF-D87C9A7C6AB3}" srcOrd="0" destOrd="0" presId="urn:microsoft.com/office/officeart/2005/8/layout/hList1"/>
     <dgm:cxn modelId="{4EFCBA5A-9326-4012-8330-0B67D6DE7F8E}" srcId="{67D5050B-C8B4-461F-BA15-B5A1B566D183}" destId="{2D0D16FC-F44D-44BC-98D9-7F25A9F363CD}" srcOrd="1" destOrd="0" parTransId="{A2A07ECB-CF54-48DF-8A52-DD861FB8EED7}" sibTransId="{0A9E1BC1-76AF-491E-8C66-63C28EF47553}"/>
-    <dgm:cxn modelId="{A6FCBC8F-4493-46D0-A242-983C9C4D2910}" type="presOf" srcId="{EB6BB3B4-F5A5-4EE4-A1C4-A5511FCE8605}" destId="{C8F60122-0708-422C-8C37-4A4DE14B071D}" srcOrd="0" destOrd="4" presId="urn:microsoft.com/office/officeart/2005/8/layout/hList1"/>
+    <dgm:cxn modelId="{A6FCBC8F-4493-46D0-A242-983C9C4D2910}" type="presOf" srcId="{EB6BB3B4-F5A5-4EE4-A1C4-A5511FCE8605}" destId="{C8F60122-0708-422C-8C37-4A4DE14B071D}" srcOrd="0" destOrd="5" presId="urn:microsoft.com/office/officeart/2005/8/layout/hList1"/>
     <dgm:cxn modelId="{BE690590-7A58-47A0-A2F8-93AF840C3CC2}" type="presOf" srcId="{67D5050B-C8B4-461F-BA15-B5A1B566D183}" destId="{EC2DAA9C-4DE0-441E-AFBD-943AB393CFCB}" srcOrd="0" destOrd="0" presId="urn:microsoft.com/office/officeart/2005/8/layout/hList1"/>
-    <dgm:cxn modelId="{D852C4B0-F375-4BE3-8E5C-C91E6C4CADB7}" srcId="{67D5050B-C8B4-461F-BA15-B5A1B566D183}" destId="{697556C2-60A4-4C9E-AC37-9D0A89B26788}" srcOrd="4" destOrd="0" parTransId="{6DC9AD85-F180-4396-81B6-8837AD1F2C51}" sibTransId="{D20AF61E-F69B-4CC5-ABF2-EF2CAB501D7B}"/>
+    <dgm:cxn modelId="{25C2819E-9FD9-4FC3-88F3-BEAB16CCD51F}" srcId="{57C570E0-3C19-4230-9E6F-DBE28A51AC6F}" destId="{30062BC1-47A3-4C6E-96DE-5B75A5D36A28}" srcOrd="4" destOrd="0" parTransId="{5191EDB7-5DA9-4972-B6C1-C45F741F46AB}" sibTransId="{3903C017-815C-4B98-8AB6-0CD73503B76B}"/>
     <dgm:cxn modelId="{9B0D75B3-49B2-43F1-B118-B2C8FADE8BFB}" type="presOf" srcId="{A3F27CBF-F5C8-4763-BC1F-F0D0BE4E3D65}" destId="{A0AC98F3-17E4-4BE5-A378-BA6D3C5FB3F5}" srcOrd="0" destOrd="0" presId="urn:microsoft.com/office/officeart/2005/8/layout/hList1"/>
     <dgm:cxn modelId="{B6ACDCB5-0675-40E3-80A6-75F58E5D16E1}" type="presOf" srcId="{B88369C4-AFBC-4F49-8C6B-D91CC5C6424F}" destId="{A0AC98F3-17E4-4BE5-A378-BA6D3C5FB3F5}" srcOrd="0" destOrd="2" presId="urn:microsoft.com/office/officeart/2005/8/layout/hList1"/>
+    <dgm:cxn modelId="{FCA7F9BE-ADD3-4478-82AD-A98E5E2FAD80}" type="presOf" srcId="{30062BC1-47A3-4C6E-96DE-5B75A5D36A28}" destId="{C8F60122-0708-422C-8C37-4A4DE14B071D}" srcOrd="0" destOrd="4" presId="urn:microsoft.com/office/officeart/2005/8/layout/hList1"/>
     <dgm:cxn modelId="{1FA891C0-C1AC-4083-80AC-8941F353DC1E}" srcId="{67D5050B-C8B4-461F-BA15-B5A1B566D183}" destId="{B88369C4-AFBC-4F49-8C6B-D91CC5C6424F}" srcOrd="2" destOrd="0" parTransId="{E97E2DB8-BBE7-4730-BCAA-BB8867B0A0E6}" sibTransId="{EDC254E8-7155-4F40-8897-6B0D733FF9A3}"/>
     <dgm:cxn modelId="{8AE2ADC2-348F-4168-9096-C4B5C19D7CEF}" srcId="{5E3F3542-CAB0-4E11-B2FB-BE482BFC7A0D}" destId="{67D5050B-C8B4-461F-BA15-B5A1B566D183}" srcOrd="1" destOrd="0" parTransId="{AAA5D7EA-1840-4447-8554-FD694A684D73}" sibTransId="{562D63D0-53A3-42C8-9221-33D8BE94A7A9}"/>
     <dgm:cxn modelId="{2CB278C4-CB09-440F-8EDF-B7B4A1C006E8}" srcId="{67D5050B-C8B4-461F-BA15-B5A1B566D183}" destId="{A3F27CBF-F5C8-4763-BC1F-F0D0BE4E3D65}" srcOrd="0" destOrd="0" parTransId="{64010DD7-E04C-49DB-8E7A-83613801BDF0}" sibTransId="{AD19519F-BD05-4B36-8F89-26218EE04205}"/>
-    <dgm:cxn modelId="{62A93AD5-4D62-4519-9827-CEFBAB1DBDE7}" srcId="{57C570E0-3C19-4230-9E6F-DBE28A51AC6F}" destId="{EB6BB3B4-F5A5-4EE4-A1C4-A5511FCE8605}" srcOrd="4" destOrd="0" parTransId="{CB7A76E1-A30C-4699-BE84-F76EE74711C2}" sibTransId="{B67BFF3B-2254-4140-860B-3D423E67906F}"/>
+    <dgm:cxn modelId="{62A93AD5-4D62-4519-9827-CEFBAB1DBDE7}" srcId="{57C570E0-3C19-4230-9E6F-DBE28A51AC6F}" destId="{EB6BB3B4-F5A5-4EE4-A1C4-A5511FCE8605}" srcOrd="5" destOrd="0" parTransId="{CB7A76E1-A30C-4699-BE84-F76EE74711C2}" sibTransId="{B67BFF3B-2254-4140-860B-3D423E67906F}"/>
     <dgm:cxn modelId="{9F9E03D7-D23A-49EB-A1F0-AA9CF2AACDCA}" srcId="{57C570E0-3C19-4230-9E6F-DBE28A51AC6F}" destId="{61541396-6934-4074-AC69-B8662B1F68D7}" srcOrd="0" destOrd="0" parTransId="{6A37AF0B-0440-485D-9CBE-5152F19576C5}" sibTransId="{4DF4AA1D-90DF-4A77-B6FB-9EBE39EBE07B}"/>
     <dgm:cxn modelId="{3201D1D8-96A6-4C97-834E-98A4354B0C93}" type="presOf" srcId="{8EE5F130-FC8E-4D0F-9FFA-C460E4B5424C}" destId="{C8F60122-0708-422C-8C37-4A4DE14B071D}" srcOrd="0" destOrd="3" presId="urn:microsoft.com/office/officeart/2005/8/layout/hList1"/>
-    <dgm:cxn modelId="{2F18C6EE-7939-44E1-A611-4D1809F85B2E}" type="presOf" srcId="{9BFD493E-13D4-4D3D-BDA6-F7C3927D6262}" destId="{C8F60122-0708-422C-8C37-4A4DE14B071D}" srcOrd="0" destOrd="5" presId="urn:microsoft.com/office/officeart/2005/8/layout/hList1"/>
+    <dgm:cxn modelId="{D4F7D2FE-10DC-459F-BCF6-A324A47A9BF4}" type="presOf" srcId="{067411F9-3661-4930-8F97-5A9AFB1272ED}" destId="{C8F60122-0708-422C-8C37-4A4DE14B071D}" srcOrd="0" destOrd="6" presId="urn:microsoft.com/office/officeart/2005/8/layout/hList1"/>
     <dgm:cxn modelId="{591FBFE9-B117-4FA8-9D8B-AEF3C5CB48AC}" type="presParOf" srcId="{CC30DAB4-3365-4A91-89AF-D87C9A7C6AB3}" destId="{C234263B-DF98-4F78-8492-046673A57D19}" srcOrd="0" destOrd="0" presId="urn:microsoft.com/office/officeart/2005/8/layout/hList1"/>
     <dgm:cxn modelId="{4E521800-B0A6-4DA2-B361-B71FD447932C}" type="presParOf" srcId="{C234263B-DF98-4F78-8492-046673A57D19}" destId="{4AB5D19E-6A22-4D78-ADB0-6985108FE4EF}" srcOrd="0" destOrd="0" presId="urn:microsoft.com/office/officeart/2005/8/layout/hList1"/>
     <dgm:cxn modelId="{D208B8A9-CED4-466E-8242-E2651037E50A}" type="presParOf" srcId="{C234263B-DF98-4F78-8492-046673A57D19}" destId="{C8F60122-0708-422C-8C37-4A4DE14B071D}" srcOrd="1" destOrd="0" presId="urn:microsoft.com/office/officeart/2005/8/layout/hList1"/>
@@ -7425,7 +7347,7 @@
       </dgm:t>
     </dgm:pt>
     <dgm:pt modelId="{61541396-6934-4074-AC69-B8662B1F68D7}">
-      <dgm:prSet phldrT="[Tekst]"/>
+      <dgm:prSet phldrT="[Tekst]" custT="1"/>
       <dgm:spPr/>
       <dgm:t>
         <a:bodyPr/>
@@ -7436,10 +7358,17 @@
             <a:buChar char="•"/>
           </a:pPr>
           <a:r>
-            <a:rPr lang="en-US" dirty="0"/>
-            <a:t>Supports the framework we use</a:t>
+            <a:rPr lang="nl-BE" sz="2800" dirty="0"/>
+            <a:t>14 </a:t>
           </a:r>
-          <a:endParaRPr lang="nl-BE" dirty="0"/>
+          <a:r>
+            <a:rPr lang="nl-BE" sz="2800" dirty="0" err="1"/>
+            <a:t>day</a:t>
+          </a:r>
+          <a:r>
+            <a:rPr lang="nl-BE" sz="2800" dirty="0"/>
+            <a:t> free trial</a:t>
+          </a:r>
         </a:p>
       </dgm:t>
     </dgm:pt>
@@ -7509,7 +7438,7 @@
       </dgm:t>
     </dgm:pt>
     <dgm:pt modelId="{5B1E6F9B-D1BC-497E-AC3B-F9D20F1A08E1}">
-      <dgm:prSet phldrT="[Tekst]"/>
+      <dgm:prSet phldrT="[Tekst]" custT="1"/>
       <dgm:spPr>
         <a:solidFill>
           <a:schemeClr val="accent6">
@@ -7528,14 +7457,9 @@
             <a:buChar char="•"/>
           </a:pPr>
           <a:r>
-            <a:rPr lang="nl-BE" dirty="0"/>
-            <a:t>Min. 3 </a:t>
+            <a:rPr lang="nl-BE" sz="2800" dirty="0"/>
+            <a:t>Opstart = Betalen</a:t>
           </a:r>
-          <a:r>
-            <a:rPr lang="nl-BE" dirty="0" err="1"/>
-            <a:t>roles</a:t>
-          </a:r>
-          <a:endParaRPr lang="nl-BE" dirty="0"/>
         </a:p>
       </dgm:t>
     </dgm:pt>
@@ -7551,492 +7475,6 @@
       </dgm:t>
     </dgm:pt>
     <dgm:pt modelId="{499ACA06-F793-4919-BD7A-34316B52A144}" type="sibTrans" cxnId="{43C0120B-D694-434E-9FC7-174615ADB606}">
-      <dgm:prSet/>
-      <dgm:spPr/>
-      <dgm:t>
-        <a:bodyPr/>
-        <a:lstStyle/>
-        <a:p>
-          <a:endParaRPr lang="nl-BE"/>
-        </a:p>
-      </dgm:t>
-    </dgm:pt>
-    <dgm:pt modelId="{7CA5EC5A-1611-4522-839C-BCC76E93E3A0}">
-      <dgm:prSet/>
-      <dgm:spPr/>
-      <dgm:t>
-        <a:bodyPr/>
-        <a:lstStyle/>
-        <a:p>
-          <a:pPr>
-            <a:buFont typeface="Arial" panose="020B0604020202020204" pitchFamily="34" charset="0"/>
-            <a:buChar char="•"/>
-          </a:pPr>
-          <a:r>
-            <a:rPr lang="nl-BE"/>
-            <a:t>Supports AWS hosting</a:t>
-          </a:r>
-        </a:p>
-      </dgm:t>
-    </dgm:pt>
-    <dgm:pt modelId="{D3792709-BC05-47C3-A4EC-B04A0F6A6C05}" type="parTrans" cxnId="{13D2CB85-1E22-4FDE-80C6-118A75384506}">
-      <dgm:prSet/>
-      <dgm:spPr/>
-      <dgm:t>
-        <a:bodyPr/>
-        <a:lstStyle/>
-        <a:p>
-          <a:endParaRPr lang="nl-BE"/>
-        </a:p>
-      </dgm:t>
-    </dgm:pt>
-    <dgm:pt modelId="{0BB7D495-6454-411E-96F7-6EE21F70B139}" type="sibTrans" cxnId="{13D2CB85-1E22-4FDE-80C6-118A75384506}">
-      <dgm:prSet/>
-      <dgm:spPr/>
-      <dgm:t>
-        <a:bodyPr/>
-        <a:lstStyle/>
-        <a:p>
-          <a:endParaRPr lang="nl-BE"/>
-        </a:p>
-      </dgm:t>
-    </dgm:pt>
-    <dgm:pt modelId="{7B987899-A08E-4F01-A449-4267B37628CE}">
-      <dgm:prSet/>
-      <dgm:spPr/>
-      <dgm:t>
-        <a:bodyPr/>
-        <a:lstStyle/>
-        <a:p>
-          <a:pPr>
-            <a:buFont typeface="Arial" panose="020B0604020202020204" pitchFamily="34" charset="0"/>
-            <a:buChar char="•"/>
-          </a:pPr>
-          <a:r>
-            <a:rPr lang="nl-BE"/>
-            <a:t>Supports multiple languages</a:t>
-          </a:r>
-        </a:p>
-      </dgm:t>
-    </dgm:pt>
-    <dgm:pt modelId="{862418AD-1160-49AD-9EEF-37ED1B8D9EBB}" type="parTrans" cxnId="{FFB127EE-9462-4E65-A70D-510238F5602F}">
-      <dgm:prSet/>
-      <dgm:spPr/>
-      <dgm:t>
-        <a:bodyPr/>
-        <a:lstStyle/>
-        <a:p>
-          <a:endParaRPr lang="nl-BE"/>
-        </a:p>
-      </dgm:t>
-    </dgm:pt>
-    <dgm:pt modelId="{4E4A26CD-8B18-41CC-BDBB-17B98B1BCA7F}" type="sibTrans" cxnId="{FFB127EE-9462-4E65-A70D-510238F5602F}">
-      <dgm:prSet/>
-      <dgm:spPr/>
-      <dgm:t>
-        <a:bodyPr/>
-        <a:lstStyle/>
-        <a:p>
-          <a:endParaRPr lang="nl-BE"/>
-        </a:p>
-      </dgm:t>
-    </dgm:pt>
-    <dgm:pt modelId="{5924286C-14EA-405C-BC2C-BEE3C3FC778E}">
-      <dgm:prSet/>
-      <dgm:spPr/>
-      <dgm:t>
-        <a:bodyPr/>
-        <a:lstStyle/>
-        <a:p>
-          <a:pPr>
-            <a:buFont typeface="Arial" panose="020B0604020202020204" pitchFamily="34" charset="0"/>
-            <a:buChar char="•"/>
-          </a:pPr>
-          <a:r>
-            <a:rPr lang="nl-BE"/>
-            <a:t>Search Engine Optimiziation</a:t>
-          </a:r>
-        </a:p>
-      </dgm:t>
-    </dgm:pt>
-    <dgm:pt modelId="{3D53411E-CA4E-419D-82A2-74905BB0D4D0}" type="parTrans" cxnId="{60665812-2C46-41F5-84F0-1064A30C2232}">
-      <dgm:prSet/>
-      <dgm:spPr/>
-      <dgm:t>
-        <a:bodyPr/>
-        <a:lstStyle/>
-        <a:p>
-          <a:endParaRPr lang="nl-BE"/>
-        </a:p>
-      </dgm:t>
-    </dgm:pt>
-    <dgm:pt modelId="{83075C92-85BB-4EC4-B0C7-D29CB950F342}" type="sibTrans" cxnId="{60665812-2C46-41F5-84F0-1064A30C2232}">
-      <dgm:prSet/>
-      <dgm:spPr/>
-      <dgm:t>
-        <a:bodyPr/>
-        <a:lstStyle/>
-        <a:p>
-          <a:endParaRPr lang="nl-BE"/>
-        </a:p>
-      </dgm:t>
-    </dgm:pt>
-    <dgm:pt modelId="{A97E94A2-6B0D-4EE2-82B1-CCCB1EB32DE8}">
-      <dgm:prSet/>
-      <dgm:spPr/>
-      <dgm:t>
-        <a:bodyPr/>
-        <a:lstStyle/>
-        <a:p>
-          <a:pPr>
-            <a:buFont typeface="Arial" panose="020B0604020202020204" pitchFamily="34" charset="0"/>
-            <a:buChar char="•"/>
-          </a:pPr>
-          <a:r>
-            <a:rPr lang="nl-BE"/>
-            <a:t>User friendly</a:t>
-          </a:r>
-        </a:p>
-      </dgm:t>
-    </dgm:pt>
-    <dgm:pt modelId="{6C1FBA58-BF58-429B-8A2C-7EDA7C6B591B}" type="parTrans" cxnId="{6C81225E-DC84-4CE7-9D80-DE572BACA730}">
-      <dgm:prSet/>
-      <dgm:spPr/>
-      <dgm:t>
-        <a:bodyPr/>
-        <a:lstStyle/>
-        <a:p>
-          <a:endParaRPr lang="nl-BE"/>
-        </a:p>
-      </dgm:t>
-    </dgm:pt>
-    <dgm:pt modelId="{F92FF1FC-9277-4DAD-9D78-FBD6011D10CD}" type="sibTrans" cxnId="{6C81225E-DC84-4CE7-9D80-DE572BACA730}">
-      <dgm:prSet/>
-      <dgm:spPr/>
-      <dgm:t>
-        <a:bodyPr/>
-        <a:lstStyle/>
-        <a:p>
-          <a:endParaRPr lang="nl-BE"/>
-        </a:p>
-      </dgm:t>
-    </dgm:pt>
-    <dgm:pt modelId="{5DF2F370-CF4D-4129-8C21-9F415888E6A5}">
-      <dgm:prSet/>
-      <dgm:spPr/>
-      <dgm:t>
-        <a:bodyPr/>
-        <a:lstStyle/>
-        <a:p>
-          <a:pPr>
-            <a:buFont typeface="Arial" panose="020B0604020202020204" pitchFamily="34" charset="0"/>
-            <a:buChar char="•"/>
-          </a:pPr>
-          <a:r>
-            <a:rPr lang="nl-BE"/>
-            <a:t>Very flexible</a:t>
-          </a:r>
-        </a:p>
-      </dgm:t>
-    </dgm:pt>
-    <dgm:pt modelId="{E9497D2A-960C-46E1-950F-3327C6768765}" type="parTrans" cxnId="{CDC25BF6-B4DE-4BF7-A649-2BB40BCD9855}">
-      <dgm:prSet/>
-      <dgm:spPr/>
-      <dgm:t>
-        <a:bodyPr/>
-        <a:lstStyle/>
-        <a:p>
-          <a:endParaRPr lang="nl-BE"/>
-        </a:p>
-      </dgm:t>
-    </dgm:pt>
-    <dgm:pt modelId="{AB54E217-C60E-4F5D-BCAC-91C360219DCC}" type="sibTrans" cxnId="{CDC25BF6-B4DE-4BF7-A649-2BB40BCD9855}">
-      <dgm:prSet/>
-      <dgm:spPr/>
-      <dgm:t>
-        <a:bodyPr/>
-        <a:lstStyle/>
-        <a:p>
-          <a:endParaRPr lang="nl-BE"/>
-        </a:p>
-      </dgm:t>
-    </dgm:pt>
-    <dgm:pt modelId="{B4B4B138-4EBF-4B11-A1FC-889459ADBFC0}">
-      <dgm:prSet/>
-      <dgm:spPr/>
-      <dgm:t>
-        <a:bodyPr/>
-        <a:lstStyle/>
-        <a:p>
-          <a:pPr>
-            <a:buFont typeface="Arial" panose="020B0604020202020204" pitchFamily="34" charset="0"/>
-            <a:buChar char="•"/>
-          </a:pPr>
-          <a:r>
-            <a:rPr lang="nl-BE" dirty="0" err="1"/>
-            <a:t>Gets</a:t>
-          </a:r>
-          <a:r>
-            <a:rPr lang="nl-BE" dirty="0"/>
-            <a:t> frequent updates</a:t>
-          </a:r>
-        </a:p>
-      </dgm:t>
-    </dgm:pt>
-    <dgm:pt modelId="{225A336C-FC97-4667-92D9-30BE30AB9A64}" type="parTrans" cxnId="{9D4A91F0-4CB1-4F3E-9D7F-0D5EB16D14E9}">
-      <dgm:prSet/>
-      <dgm:spPr/>
-      <dgm:t>
-        <a:bodyPr/>
-        <a:lstStyle/>
-        <a:p>
-          <a:endParaRPr lang="nl-BE"/>
-        </a:p>
-      </dgm:t>
-    </dgm:pt>
-    <dgm:pt modelId="{019CE8F3-FC06-4468-A769-D7937482E6F8}" type="sibTrans" cxnId="{9D4A91F0-4CB1-4F3E-9D7F-0D5EB16D14E9}">
-      <dgm:prSet/>
-      <dgm:spPr/>
-      <dgm:t>
-        <a:bodyPr/>
-        <a:lstStyle/>
-        <a:p>
-          <a:endParaRPr lang="nl-BE"/>
-        </a:p>
-      </dgm:t>
-    </dgm:pt>
-    <dgm:pt modelId="{3594542B-315D-4CB3-900F-21D398F6E0E9}">
-      <dgm:prSet/>
-      <dgm:spPr/>
-      <dgm:t>
-        <a:bodyPr/>
-        <a:lstStyle/>
-        <a:p>
-          <a:pPr>
-            <a:buFont typeface="Arial" panose="020B0604020202020204" pitchFamily="34" charset="0"/>
-            <a:buChar char="•"/>
-          </a:pPr>
-          <a:r>
-            <a:rPr lang="nl-BE" b="0" dirty="0"/>
-            <a:t>Built-in </a:t>
-          </a:r>
-          <a:r>
-            <a:rPr lang="nl-BE" b="0" dirty="0" err="1"/>
-            <a:t>Backups</a:t>
-          </a:r>
-          <a:r>
-            <a:rPr lang="nl-BE" b="0" dirty="0"/>
-            <a:t> &amp; </a:t>
-          </a:r>
-          <a:r>
-            <a:rPr lang="nl-BE" b="0" dirty="0" err="1"/>
-            <a:t>Restore</a:t>
-          </a:r>
-          <a:endParaRPr lang="nl-BE" b="0" dirty="0"/>
-        </a:p>
-      </dgm:t>
-    </dgm:pt>
-    <dgm:pt modelId="{4D7473BB-9CA7-4B3E-9A14-0146DB4E52D0}" type="parTrans" cxnId="{4DA9B7C5-A5DE-476A-87C8-1DC3EFC6D72D}">
-      <dgm:prSet/>
-      <dgm:spPr/>
-      <dgm:t>
-        <a:bodyPr/>
-        <a:lstStyle/>
-        <a:p>
-          <a:endParaRPr lang="nl-BE"/>
-        </a:p>
-      </dgm:t>
-    </dgm:pt>
-    <dgm:pt modelId="{8640592F-5A3A-448F-9CE9-DD42CACF33FF}" type="sibTrans" cxnId="{4DA9B7C5-A5DE-476A-87C8-1DC3EFC6D72D}">
-      <dgm:prSet/>
-      <dgm:spPr/>
-      <dgm:t>
-        <a:bodyPr/>
-        <a:lstStyle/>
-        <a:p>
-          <a:endParaRPr lang="nl-BE"/>
-        </a:p>
-      </dgm:t>
-    </dgm:pt>
-    <dgm:pt modelId="{B7130DC1-E7FA-43BD-BBAB-27418650D48D}">
-      <dgm:prSet/>
-      <dgm:spPr/>
-      <dgm:t>
-        <a:bodyPr/>
-        <a:lstStyle/>
-        <a:p>
-          <a:pPr>
-            <a:buFont typeface="Arial" panose="020B0604020202020204" pitchFamily="34" charset="0"/>
-            <a:buChar char="•"/>
-          </a:pPr>
-          <a:r>
-            <a:rPr lang="nl-BE"/>
-            <a:t>Plugin marketplace</a:t>
-          </a:r>
-        </a:p>
-      </dgm:t>
-    </dgm:pt>
-    <dgm:pt modelId="{B26C41AE-9E95-45D2-9811-AE2517CD2046}" type="parTrans" cxnId="{954D712B-8600-4183-843D-97841D862F2D}">
-      <dgm:prSet/>
-      <dgm:spPr/>
-      <dgm:t>
-        <a:bodyPr/>
-        <a:lstStyle/>
-        <a:p>
-          <a:endParaRPr lang="nl-BE"/>
-        </a:p>
-      </dgm:t>
-    </dgm:pt>
-    <dgm:pt modelId="{FF1E421F-F744-43B4-8326-36079149525F}" type="sibTrans" cxnId="{954D712B-8600-4183-843D-97841D862F2D}">
-      <dgm:prSet/>
-      <dgm:spPr/>
-      <dgm:t>
-        <a:bodyPr/>
-        <a:lstStyle/>
-        <a:p>
-          <a:endParaRPr lang="nl-BE"/>
-        </a:p>
-      </dgm:t>
-    </dgm:pt>
-    <dgm:pt modelId="{929C931C-3DA9-4AF1-8DA5-4D378A4C2444}">
-      <dgm:prSet/>
-      <dgm:spPr/>
-      <dgm:t>
-        <a:bodyPr/>
-        <a:lstStyle/>
-        <a:p>
-          <a:pPr>
-            <a:buFont typeface="Arial" panose="020B0604020202020204" pitchFamily="34" charset="0"/>
-            <a:buChar char="•"/>
-          </a:pPr>
-          <a:r>
-            <a:rPr lang="nl-BE" dirty="0"/>
-            <a:t>Easy Quick start</a:t>
-          </a:r>
-        </a:p>
-      </dgm:t>
-    </dgm:pt>
-    <dgm:pt modelId="{B2F188F2-C330-4FCF-B4D9-D9FD7A3C52B7}" type="parTrans" cxnId="{450F6438-D6F9-48D8-9308-5E233C8E2463}">
-      <dgm:prSet/>
-      <dgm:spPr/>
-      <dgm:t>
-        <a:bodyPr/>
-        <a:lstStyle/>
-        <a:p>
-          <a:endParaRPr lang="nl-BE"/>
-        </a:p>
-      </dgm:t>
-    </dgm:pt>
-    <dgm:pt modelId="{FAD426F7-DDE9-45C0-BA68-C2B78FBB1881}" type="sibTrans" cxnId="{450F6438-D6F9-48D8-9308-5E233C8E2463}">
-      <dgm:prSet/>
-      <dgm:spPr/>
-      <dgm:t>
-        <a:bodyPr/>
-        <a:lstStyle/>
-        <a:p>
-          <a:endParaRPr lang="nl-BE"/>
-        </a:p>
-      </dgm:t>
-    </dgm:pt>
-    <dgm:pt modelId="{789BF1A6-89A3-472E-98BA-B1B2D82FBC10}">
-      <dgm:prSet/>
-      <dgm:spPr>
-        <a:solidFill>
-          <a:schemeClr val="accent6">
-            <a:lumMod val="40000"/>
-            <a:lumOff val="60000"/>
-            <a:alpha val="90000"/>
-          </a:schemeClr>
-        </a:solidFill>
-      </dgm:spPr>
-      <dgm:t>
-        <a:bodyPr/>
-        <a:lstStyle/>
-        <a:p>
-          <a:pPr>
-            <a:buFont typeface="Arial" panose="020B0604020202020204" pitchFamily="34" charset="0"/>
-            <a:buChar char="•"/>
-          </a:pPr>
-          <a:r>
-            <a:rPr lang="nl-BE" dirty="0"/>
-            <a:t>via UI (editor)</a:t>
-          </a:r>
-        </a:p>
-      </dgm:t>
-    </dgm:pt>
-    <dgm:pt modelId="{AE33E5BF-FDA4-4B8D-B63D-5EEDBE14CFC3}" type="parTrans" cxnId="{8D5164CF-27CD-4303-9070-AF45A9D571CB}">
-      <dgm:prSet/>
-      <dgm:spPr/>
-      <dgm:t>
-        <a:bodyPr/>
-        <a:lstStyle/>
-        <a:p>
-          <a:endParaRPr lang="nl-BE"/>
-        </a:p>
-      </dgm:t>
-    </dgm:pt>
-    <dgm:pt modelId="{073401F9-B6C5-417D-9339-9C8B0618DDE7}" type="sibTrans" cxnId="{8D5164CF-27CD-4303-9070-AF45A9D571CB}">
-      <dgm:prSet/>
-      <dgm:spPr/>
-      <dgm:t>
-        <a:bodyPr/>
-        <a:lstStyle/>
-        <a:p>
-          <a:endParaRPr lang="nl-BE"/>
-        </a:p>
-      </dgm:t>
-    </dgm:pt>
-    <dgm:pt modelId="{E9A76FCC-6E2E-44C3-A2DD-CB1548FD3A7A}">
-      <dgm:prSet/>
-      <dgm:spPr>
-        <a:solidFill>
-          <a:schemeClr val="accent6">
-            <a:lumMod val="40000"/>
-            <a:lumOff val="60000"/>
-            <a:alpha val="90000"/>
-          </a:schemeClr>
-        </a:solidFill>
-      </dgm:spPr>
-      <dgm:t>
-        <a:bodyPr/>
-        <a:lstStyle/>
-        <a:p>
-          <a:pPr>
-            <a:buFont typeface="Arial" panose="020B0604020202020204" pitchFamily="34" charset="0"/>
-            <a:buChar char="•"/>
-          </a:pPr>
-          <a:r>
-            <a:rPr lang="nl-BE" dirty="0"/>
-            <a:t>Weinig </a:t>
-          </a:r>
-          <a:r>
-            <a:rPr lang="nl-BE" dirty="0" err="1"/>
-            <a:t>Plugins</a:t>
-          </a:r>
-          <a:r>
-            <a:rPr lang="nl-BE" dirty="0"/>
-            <a:t> </a:t>
-          </a:r>
-          <a:r>
-            <a:rPr lang="nl-BE" dirty="0" err="1"/>
-            <a:t>marketplace</a:t>
-          </a:r>
-          <a:endParaRPr lang="nl-BE" dirty="0"/>
-        </a:p>
-      </dgm:t>
-    </dgm:pt>
-    <dgm:pt modelId="{6628DF8E-4198-408E-A205-08434E953BCB}" type="parTrans" cxnId="{B41B76E7-EB82-48E3-8559-D6F300984EC1}">
-      <dgm:prSet/>
-      <dgm:spPr/>
-      <dgm:t>
-        <a:bodyPr/>
-        <a:lstStyle/>
-        <a:p>
-          <a:endParaRPr lang="nl-BE"/>
-        </a:p>
-      </dgm:t>
-    </dgm:pt>
-    <dgm:pt modelId="{9F687F5C-80B7-4EE0-B3B5-E1CB10550F1F}" type="sibTrans" cxnId="{B41B76E7-EB82-48E3-8559-D6F300984EC1}">
       <dgm:prSet/>
       <dgm:spPr/>
       <dgm:t>
@@ -8108,36 +7546,14 @@
   </dgm:ptLst>
   <dgm:cxnLst>
     <dgm:cxn modelId="{43C0120B-D694-434E-9FC7-174615ADB606}" srcId="{67D5050B-C8B4-461F-BA15-B5A1B566D183}" destId="{5B1E6F9B-D1BC-497E-AC3B-F9D20F1A08E1}" srcOrd="0" destOrd="0" parTransId="{F31A2A46-03C6-421B-9B4D-68C9CBAD3A19}" sibTransId="{499ACA06-F793-4919-BD7A-34316B52A144}"/>
-    <dgm:cxn modelId="{60665812-2C46-41F5-84F0-1064A30C2232}" srcId="{57C570E0-3C19-4230-9E6F-DBE28A51AC6F}" destId="{5924286C-14EA-405C-BC2C-BEE3C3FC778E}" srcOrd="3" destOrd="0" parTransId="{3D53411E-CA4E-419D-82A2-74905BB0D4D0}" sibTransId="{83075C92-85BB-4EC4-B0C7-D29CB950F342}"/>
-    <dgm:cxn modelId="{954D712B-8600-4183-843D-97841D862F2D}" srcId="{57C570E0-3C19-4230-9E6F-DBE28A51AC6F}" destId="{B7130DC1-E7FA-43BD-BBAB-27418650D48D}" srcOrd="8" destOrd="0" parTransId="{B26C41AE-9E95-45D2-9811-AE2517CD2046}" sibTransId="{FF1E421F-F744-43B4-8326-36079149525F}"/>
-    <dgm:cxn modelId="{450F6438-D6F9-48D8-9308-5E233C8E2463}" srcId="{57C570E0-3C19-4230-9E6F-DBE28A51AC6F}" destId="{929C931C-3DA9-4AF1-8DA5-4D378A4C2444}" srcOrd="9" destOrd="0" parTransId="{B2F188F2-C330-4FCF-B4D9-D9FD7A3C52B7}" sibTransId="{FAD426F7-DDE9-45C0-BA68-C2B78FBB1881}"/>
-    <dgm:cxn modelId="{6C81225E-DC84-4CE7-9D80-DE572BACA730}" srcId="{57C570E0-3C19-4230-9E6F-DBE28A51AC6F}" destId="{A97E94A2-6B0D-4EE2-82B1-CCCB1EB32DE8}" srcOrd="4" destOrd="0" parTransId="{6C1FBA58-BF58-429B-8A2C-7EDA7C6B591B}" sibTransId="{F92FF1FC-9277-4DAD-9D78-FBD6011D10CD}"/>
-    <dgm:cxn modelId="{96D74C60-DD1D-4D3B-9B06-A780F2FBAD53}" type="presOf" srcId="{E9A76FCC-6E2E-44C3-A2DD-CB1548FD3A7A}" destId="{A0AC98F3-17E4-4BE5-A378-BA6D3C5FB3F5}" srcOrd="0" destOrd="2" presId="urn:microsoft.com/office/officeart/2005/8/layout/hList1"/>
     <dgm:cxn modelId="{7CDDEC45-C8A0-4148-A1B3-25BF5EB63758}" type="presOf" srcId="{61541396-6934-4074-AC69-B8662B1F68D7}" destId="{C8F60122-0708-422C-8C37-4A4DE14B071D}" srcOrd="0" destOrd="0" presId="urn:microsoft.com/office/officeart/2005/8/layout/hList1"/>
     <dgm:cxn modelId="{0270CF6A-9EEE-4F35-B88D-B069AEB22759}" type="presOf" srcId="{57C570E0-3C19-4230-9E6F-DBE28A51AC6F}" destId="{4AB5D19E-6A22-4D78-ADB0-6985108FE4EF}" srcOrd="0" destOrd="0" presId="urn:microsoft.com/office/officeart/2005/8/layout/hList1"/>
-    <dgm:cxn modelId="{B654B774-F611-4F2C-8168-3B270866D7AF}" type="presOf" srcId="{5DF2F370-CF4D-4129-8C21-9F415888E6A5}" destId="{C8F60122-0708-422C-8C37-4A4DE14B071D}" srcOrd="0" destOrd="5" presId="urn:microsoft.com/office/officeart/2005/8/layout/hList1"/>
     <dgm:cxn modelId="{128BBA74-72C2-435C-923A-2541A7FC194A}" srcId="{5E3F3542-CAB0-4E11-B2FB-BE482BFC7A0D}" destId="{57C570E0-3C19-4230-9E6F-DBE28A51AC6F}" srcOrd="0" destOrd="0" parTransId="{FDAB65A9-4017-4C0C-A15F-799A5BC91462}" sibTransId="{43EBE2EC-0CDF-40FD-8FC6-D7C226777F7D}"/>
-    <dgm:cxn modelId="{34AAEB54-E9B0-42AB-8892-FBBC566808C6}" type="presOf" srcId="{7CA5EC5A-1611-4522-839C-BCC76E93E3A0}" destId="{C8F60122-0708-422C-8C37-4A4DE14B071D}" srcOrd="0" destOrd="1" presId="urn:microsoft.com/office/officeart/2005/8/layout/hList1"/>
-    <dgm:cxn modelId="{576C4875-6B9B-418A-8E9B-EB7AB7AABB56}" type="presOf" srcId="{B7130DC1-E7FA-43BD-BBAB-27418650D48D}" destId="{C8F60122-0708-422C-8C37-4A4DE14B071D}" srcOrd="0" destOrd="8" presId="urn:microsoft.com/office/officeart/2005/8/layout/hList1"/>
     <dgm:cxn modelId="{E912227A-01F2-4AB4-96B5-E231EEEF10BB}" type="presOf" srcId="{5E3F3542-CAB0-4E11-B2FB-BE482BFC7A0D}" destId="{CC30DAB4-3365-4A91-89AF-D87C9A7C6AB3}" srcOrd="0" destOrd="0" presId="urn:microsoft.com/office/officeart/2005/8/layout/hList1"/>
-    <dgm:cxn modelId="{464D567B-413F-4788-A81B-47DA8B948CF9}" type="presOf" srcId="{A97E94A2-6B0D-4EE2-82B1-CCCB1EB32DE8}" destId="{C8F60122-0708-422C-8C37-4A4DE14B071D}" srcOrd="0" destOrd="4" presId="urn:microsoft.com/office/officeart/2005/8/layout/hList1"/>
-    <dgm:cxn modelId="{EB86F97C-40BA-4707-8766-3AB7380F8316}" type="presOf" srcId="{789BF1A6-89A3-472E-98BA-B1B2D82FBC10}" destId="{A0AC98F3-17E4-4BE5-A378-BA6D3C5FB3F5}" srcOrd="0" destOrd="1" presId="urn:microsoft.com/office/officeart/2005/8/layout/hList1"/>
-    <dgm:cxn modelId="{13D2CB85-1E22-4FDE-80C6-118A75384506}" srcId="{57C570E0-3C19-4230-9E6F-DBE28A51AC6F}" destId="{7CA5EC5A-1611-4522-839C-BCC76E93E3A0}" srcOrd="1" destOrd="0" parTransId="{D3792709-BC05-47C3-A4EC-B04A0F6A6C05}" sibTransId="{0BB7D495-6454-411E-96F7-6EE21F70B139}"/>
     <dgm:cxn modelId="{BE690590-7A58-47A0-A2F8-93AF840C3CC2}" type="presOf" srcId="{67D5050B-C8B4-461F-BA15-B5A1B566D183}" destId="{EC2DAA9C-4DE0-441E-AFBD-943AB393CFCB}" srcOrd="0" destOrd="0" presId="urn:microsoft.com/office/officeart/2005/8/layout/hList1"/>
-    <dgm:cxn modelId="{A53AAA93-EBC6-418E-8ED7-41F855A7BEDE}" type="presOf" srcId="{B4B4B138-4EBF-4B11-A1FC-889459ADBFC0}" destId="{C8F60122-0708-422C-8C37-4A4DE14B071D}" srcOrd="0" destOrd="6" presId="urn:microsoft.com/office/officeart/2005/8/layout/hList1"/>
     <dgm:cxn modelId="{73A9C9B1-A8E3-4542-9933-16354EEA5F0D}" type="presOf" srcId="{5B1E6F9B-D1BC-497E-AC3B-F9D20F1A08E1}" destId="{A0AC98F3-17E4-4BE5-A378-BA6D3C5FB3F5}" srcOrd="0" destOrd="0" presId="urn:microsoft.com/office/officeart/2005/8/layout/hList1"/>
-    <dgm:cxn modelId="{A4F5C4B7-EACE-4A7D-9707-482A52C2F8A7}" type="presOf" srcId="{5924286C-14EA-405C-BC2C-BEE3C3FC778E}" destId="{C8F60122-0708-422C-8C37-4A4DE14B071D}" srcOrd="0" destOrd="3" presId="urn:microsoft.com/office/officeart/2005/8/layout/hList1"/>
     <dgm:cxn modelId="{8AE2ADC2-348F-4168-9096-C4B5C19D7CEF}" srcId="{5E3F3542-CAB0-4E11-B2FB-BE482BFC7A0D}" destId="{67D5050B-C8B4-461F-BA15-B5A1B566D183}" srcOrd="1" destOrd="0" parTransId="{AAA5D7EA-1840-4447-8554-FD694A684D73}" sibTransId="{562D63D0-53A3-42C8-9221-33D8BE94A7A9}"/>
-    <dgm:cxn modelId="{4DA9B7C5-A5DE-476A-87C8-1DC3EFC6D72D}" srcId="{57C570E0-3C19-4230-9E6F-DBE28A51AC6F}" destId="{3594542B-315D-4CB3-900F-21D398F6E0E9}" srcOrd="7" destOrd="0" parTransId="{4D7473BB-9CA7-4B3E-9A14-0146DB4E52D0}" sibTransId="{8640592F-5A3A-448F-9CE9-DD42CACF33FF}"/>
-    <dgm:cxn modelId="{09B9D7CB-9EA9-4F26-BCD5-AA32FA7C5DCA}" type="presOf" srcId="{3594542B-315D-4CB3-900F-21D398F6E0E9}" destId="{C8F60122-0708-422C-8C37-4A4DE14B071D}" srcOrd="0" destOrd="7" presId="urn:microsoft.com/office/officeart/2005/8/layout/hList1"/>
-    <dgm:cxn modelId="{EF5356CE-1310-4244-81AF-7DD100BBB6FA}" type="presOf" srcId="{929C931C-3DA9-4AF1-8DA5-4D378A4C2444}" destId="{C8F60122-0708-422C-8C37-4A4DE14B071D}" srcOrd="0" destOrd="9" presId="urn:microsoft.com/office/officeart/2005/8/layout/hList1"/>
-    <dgm:cxn modelId="{8D5164CF-27CD-4303-9070-AF45A9D571CB}" srcId="{67D5050B-C8B4-461F-BA15-B5A1B566D183}" destId="{789BF1A6-89A3-472E-98BA-B1B2D82FBC10}" srcOrd="1" destOrd="0" parTransId="{AE33E5BF-FDA4-4B8D-B63D-5EEDBE14CFC3}" sibTransId="{073401F9-B6C5-417D-9339-9C8B0618DDE7}"/>
     <dgm:cxn modelId="{9F9E03D7-D23A-49EB-A1F0-AA9CF2AACDCA}" srcId="{57C570E0-3C19-4230-9E6F-DBE28A51AC6F}" destId="{61541396-6934-4074-AC69-B8662B1F68D7}" srcOrd="0" destOrd="0" parTransId="{6A37AF0B-0440-485D-9CBE-5152F19576C5}" sibTransId="{4DF4AA1D-90DF-4A77-B6FB-9EBE39EBE07B}"/>
-    <dgm:cxn modelId="{5A9BF8D9-C551-4F7B-BEFB-122F314F0EF9}" type="presOf" srcId="{7B987899-A08E-4F01-A449-4267B37628CE}" destId="{C8F60122-0708-422C-8C37-4A4DE14B071D}" srcOrd="0" destOrd="2" presId="urn:microsoft.com/office/officeart/2005/8/layout/hList1"/>
-    <dgm:cxn modelId="{B41B76E7-EB82-48E3-8559-D6F300984EC1}" srcId="{67D5050B-C8B4-461F-BA15-B5A1B566D183}" destId="{E9A76FCC-6E2E-44C3-A2DD-CB1548FD3A7A}" srcOrd="2" destOrd="0" parTransId="{6628DF8E-4198-408E-A205-08434E953BCB}" sibTransId="{9F687F5C-80B7-4EE0-B3B5-E1CB10550F1F}"/>
-    <dgm:cxn modelId="{FFB127EE-9462-4E65-A70D-510238F5602F}" srcId="{57C570E0-3C19-4230-9E6F-DBE28A51AC6F}" destId="{7B987899-A08E-4F01-A449-4267B37628CE}" srcOrd="2" destOrd="0" parTransId="{862418AD-1160-49AD-9EEF-37ED1B8D9EBB}" sibTransId="{4E4A26CD-8B18-41CC-BDBB-17B98B1BCA7F}"/>
-    <dgm:cxn modelId="{9D4A91F0-4CB1-4F3E-9D7F-0D5EB16D14E9}" srcId="{57C570E0-3C19-4230-9E6F-DBE28A51AC6F}" destId="{B4B4B138-4EBF-4B11-A1FC-889459ADBFC0}" srcOrd="6" destOrd="0" parTransId="{225A336C-FC97-4667-92D9-30BE30AB9A64}" sibTransId="{019CE8F3-FC06-4468-A769-D7937482E6F8}"/>
-    <dgm:cxn modelId="{CDC25BF6-B4DE-4BF7-A649-2BB40BCD9855}" srcId="{57C570E0-3C19-4230-9E6F-DBE28A51AC6F}" destId="{5DF2F370-CF4D-4129-8C21-9F415888E6A5}" srcOrd="5" destOrd="0" parTransId="{E9497D2A-960C-46E1-950F-3327C6768765}" sibTransId="{AB54E217-C60E-4F5D-BCAC-91C360219DCC}"/>
     <dgm:cxn modelId="{591FBFE9-B117-4FA8-9D8B-AEF3C5CB48AC}" type="presParOf" srcId="{CC30DAB4-3365-4A91-89AF-D87C9A7C6AB3}" destId="{C234263B-DF98-4F78-8492-046673A57D19}" srcOrd="0" destOrd="0" presId="urn:microsoft.com/office/officeart/2005/8/layout/hList1"/>
     <dgm:cxn modelId="{4E521800-B0A6-4DA2-B361-B71FD447932C}" type="presParOf" srcId="{C234263B-DF98-4F78-8492-046673A57D19}" destId="{4AB5D19E-6A22-4D78-ADB0-6985108FE4EF}" srcOrd="0" destOrd="0" presId="urn:microsoft.com/office/officeart/2005/8/layout/hList1"/>
     <dgm:cxn modelId="{D208B8A9-CED4-466E-8242-E2651037E50A}" type="presParOf" srcId="{C234263B-DF98-4F78-8492-046673A57D19}" destId="{C8F60122-0708-422C-8C37-4A4DE14B071D}" srcOrd="1" destOrd="0" presId="urn:microsoft.com/office/officeart/2005/8/layout/hList1"/>
@@ -9755,8 +9171,8 @@
       </dsp:nvSpPr>
       <dsp:spPr>
         <a:xfrm>
-          <a:off x="51" y="43119"/>
-          <a:ext cx="4913783" cy="806400"/>
+          <a:off x="51" y="237294"/>
+          <a:ext cx="4913783" cy="720000"/>
         </a:xfrm>
         <a:prstGeom prst="rect">
           <a:avLst/>
@@ -9793,12 +9209,12 @@
         </a:fontRef>
       </dsp:style>
       <dsp:txBody>
-        <a:bodyPr spcFirstLastPara="0" vert="horz" wrap="square" lIns="199136" tIns="113792" rIns="199136" bIns="113792" numCol="1" spcCol="1270" anchor="ctr" anchorCtr="0">
+        <a:bodyPr spcFirstLastPara="0" vert="horz" wrap="square" lIns="177800" tIns="101600" rIns="177800" bIns="101600" numCol="1" spcCol="1270" anchor="ctr" anchorCtr="0">
           <a:noAutofit/>
         </a:bodyPr>
         <a:lstStyle/>
         <a:p>
-          <a:pPr marL="0" lvl="0" indent="0" algn="ctr" defTabSz="1244600">
+          <a:pPr marL="0" lvl="0" indent="0" algn="ctr" defTabSz="1111250">
             <a:lnSpc>
               <a:spcPct val="90000"/>
             </a:lnSpc>
@@ -9811,14 +9227,14 @@
             <a:buNone/>
           </a:pPr>
           <a:r>
-            <a:rPr lang="nl-BE" sz="2800" kern="1200" dirty="0"/>
+            <a:rPr lang="nl-BE" sz="2500" kern="1200" dirty="0"/>
             <a:t>Pros</a:t>
           </a:r>
         </a:p>
       </dsp:txBody>
       <dsp:txXfrm>
-        <a:off x="51" y="43119"/>
-        <a:ext cx="4913783" cy="806400"/>
+        <a:off x="51" y="237294"/>
+        <a:ext cx="4913783" cy="720000"/>
       </dsp:txXfrm>
     </dsp:sp>
     <dsp:sp modelId="{C8F60122-0708-422C-8C37-4A4DE14B071D}">
@@ -9828,8 +9244,8 @@
       </dsp:nvSpPr>
       <dsp:spPr>
         <a:xfrm>
-          <a:off x="51" y="849519"/>
-          <a:ext cx="4913783" cy="3458699"/>
+          <a:off x="51" y="957294"/>
+          <a:ext cx="4913783" cy="3156750"/>
         </a:xfrm>
         <a:prstGeom prst="rect">
           <a:avLst/>
@@ -9873,12 +9289,12 @@
         <a:fontRef idx="minor"/>
       </dsp:style>
       <dsp:txBody>
-        <a:bodyPr spcFirstLastPara="0" vert="horz" wrap="square" lIns="149352" tIns="149352" rIns="199136" bIns="224028" numCol="1" spcCol="1270" anchor="t" anchorCtr="0">
+        <a:bodyPr spcFirstLastPara="0" vert="horz" wrap="square" lIns="133350" tIns="133350" rIns="177800" bIns="200025" numCol="1" spcCol="1270" anchor="t" anchorCtr="0">
           <a:noAutofit/>
         </a:bodyPr>
         <a:lstStyle/>
         <a:p>
-          <a:pPr marL="285750" lvl="1" indent="-285750" algn="l" defTabSz="1244600">
+          <a:pPr marL="228600" lvl="1" indent="-228600" algn="l" defTabSz="1111250">
             <a:lnSpc>
               <a:spcPct val="90000"/>
             </a:lnSpc>
@@ -9892,13 +9308,13 @@
             <a:buChar char="•"/>
           </a:pPr>
           <a:r>
-            <a:rPr lang="en-US" sz="2800" kern="1200" dirty="0"/>
+            <a:rPr lang="en-US" sz="2500" kern="1200" dirty="0"/>
             <a:t>Supports the Frameworks we use</a:t>
           </a:r>
-          <a:endParaRPr lang="nl-BE" sz="2800" kern="1200" dirty="0"/>
-        </a:p>
-        <a:p>
-          <a:pPr marL="285750" lvl="1" indent="-285750" algn="l" defTabSz="1244600">
+          <a:endParaRPr lang="nl-BE" sz="2500" kern="1200" dirty="0"/>
+        </a:p>
+        <a:p>
+          <a:pPr marL="228600" lvl="1" indent="-228600" algn="l" defTabSz="1111250">
             <a:lnSpc>
               <a:spcPct val="90000"/>
             </a:lnSpc>
@@ -9912,12 +9328,16 @@
             <a:buChar char="•"/>
           </a:pPr>
           <a:r>
-            <a:rPr lang="nl-BE" sz="2800" kern="1200"/>
-            <a:t>Gets frequent updates</a:t>
+            <a:rPr lang="nl-BE" sz="2500" kern="1200" dirty="0" err="1"/>
+            <a:t>Gets</a:t>
           </a:r>
-        </a:p>
-        <a:p>
-          <a:pPr marL="285750" lvl="1" indent="-285750" algn="l" defTabSz="1244600">
+          <a:r>
+            <a:rPr lang="nl-BE" sz="2500" kern="1200" dirty="0"/>
+            <a:t> frequent updates</a:t>
+          </a:r>
+        </a:p>
+        <a:p>
+          <a:pPr marL="228600" lvl="1" indent="-228600" algn="l" defTabSz="1111250">
             <a:lnSpc>
               <a:spcPct val="90000"/>
             </a:lnSpc>
@@ -9931,17 +9351,17 @@
             <a:buChar char="•"/>
           </a:pPr>
           <a:r>
-            <a:rPr lang="nl-BE" sz="2800" kern="1200" dirty="0"/>
+            <a:rPr lang="nl-BE" sz="2500" kern="1200" dirty="0"/>
             <a:t>5 user </a:t>
           </a:r>
           <a:r>
-            <a:rPr lang="nl-BE" sz="2800" kern="1200" dirty="0" err="1"/>
+            <a:rPr lang="nl-BE" sz="2500" kern="1200" dirty="0" err="1"/>
             <a:t>roles</a:t>
           </a:r>
-          <a:endParaRPr lang="nl-BE" sz="2800" kern="1200" dirty="0"/>
-        </a:p>
-        <a:p>
-          <a:pPr marL="285750" lvl="1" indent="-285750" algn="l" defTabSz="1244600">
+          <a:endParaRPr lang="nl-BE" sz="2500" kern="1200" dirty="0"/>
+        </a:p>
+        <a:p>
+          <a:pPr marL="228600" lvl="1" indent="-228600" algn="l" defTabSz="1111250">
             <a:lnSpc>
               <a:spcPct val="90000"/>
             </a:lnSpc>
@@ -9955,12 +9375,12 @@
             <a:buChar char="•"/>
           </a:pPr>
           <a:r>
-            <a:rPr lang="nl-BE" sz="2800" b="0" kern="1200" dirty="0"/>
+            <a:rPr lang="nl-BE" sz="2500" b="0" kern="1200" dirty="0"/>
             <a:t>Preview Content</a:t>
           </a:r>
         </a:p>
         <a:p>
-          <a:pPr marL="285750" lvl="1" indent="-285750" algn="l" defTabSz="1244600">
+          <a:pPr marL="228600" lvl="1" indent="-228600" algn="l" defTabSz="1111250">
             <a:lnSpc>
               <a:spcPct val="90000"/>
             </a:lnSpc>
@@ -9974,12 +9394,12 @@
             <a:buChar char="•"/>
           </a:pPr>
           <a:r>
-            <a:rPr lang="nl-BE" sz="2800" kern="1200"/>
-            <a:t>user friendly interface</a:t>
+            <a:rPr lang="nl-BE" sz="2500" b="0" kern="1200" dirty="0"/>
+            <a:t>AWS hosting</a:t>
           </a:r>
         </a:p>
         <a:p>
-          <a:pPr marL="285750" lvl="1" indent="-285750" algn="l" defTabSz="1244600">
+          <a:pPr marL="228600" lvl="1" indent="-228600" algn="l" defTabSz="1111250">
             <a:lnSpc>
               <a:spcPct val="90000"/>
             </a:lnSpc>
@@ -9993,18 +9413,41 @@
             <a:buChar char="•"/>
           </a:pPr>
           <a:r>
-            <a:rPr lang="nl-BE" sz="2800" b="0" kern="1200" dirty="0"/>
-            <a:t>Enterprise Trial </a:t>
+            <a:rPr lang="nl-BE" sz="2500" kern="1200" dirty="0"/>
+            <a:t>user </a:t>
           </a:r>
           <a:r>
-            <a:rPr lang="nl-BE" sz="2800" kern="1200" dirty="0"/>
-            <a:t>aanvragen</a:t>
+            <a:rPr lang="nl-BE" sz="2500" kern="1200" dirty="0" err="1"/>
+            <a:t>friendly</a:t>
+          </a:r>
+          <a:r>
+            <a:rPr lang="nl-BE" sz="2500" kern="1200" dirty="0"/>
+            <a:t> interface</a:t>
+          </a:r>
+        </a:p>
+        <a:p>
+          <a:pPr marL="228600" lvl="1" indent="-228600" algn="l" defTabSz="1111250">
+            <a:lnSpc>
+              <a:spcPct val="90000"/>
+            </a:lnSpc>
+            <a:spcBef>
+              <a:spcPct val="0"/>
+            </a:spcBef>
+            <a:spcAft>
+              <a:spcPct val="15000"/>
+            </a:spcAft>
+            <a:buFont typeface="Arial" panose="020B0604020202020204" pitchFamily="34" charset="0"/>
+            <a:buChar char="•"/>
+          </a:pPr>
+          <a:r>
+            <a:rPr lang="nl-BE" sz="2500" kern="1200" dirty="0"/>
+            <a:t>easy Quick start</a:t>
           </a:r>
         </a:p>
       </dsp:txBody>
       <dsp:txXfrm>
-        <a:off x="51" y="849519"/>
-        <a:ext cx="4913783" cy="3458699"/>
+        <a:off x="51" y="957294"/>
+        <a:ext cx="4913783" cy="3156750"/>
       </dsp:txXfrm>
     </dsp:sp>
     <dsp:sp modelId="{EC2DAA9C-4DE0-441E-AFBD-943AB393CFCB}">
@@ -10014,8 +9457,8 @@
       </dsp:nvSpPr>
       <dsp:spPr>
         <a:xfrm>
-          <a:off x="5601764" y="43119"/>
-          <a:ext cx="4913783" cy="806400"/>
+          <a:off x="5601764" y="237294"/>
+          <a:ext cx="4913783" cy="720000"/>
         </a:xfrm>
         <a:prstGeom prst="rect">
           <a:avLst/>
@@ -10054,12 +9497,12 @@
         </a:fontRef>
       </dsp:style>
       <dsp:txBody>
-        <a:bodyPr spcFirstLastPara="0" vert="horz" wrap="square" lIns="199136" tIns="113792" rIns="199136" bIns="113792" numCol="1" spcCol="1270" anchor="ctr" anchorCtr="0">
+        <a:bodyPr spcFirstLastPara="0" vert="horz" wrap="square" lIns="177800" tIns="101600" rIns="177800" bIns="101600" numCol="1" spcCol="1270" anchor="ctr" anchorCtr="0">
           <a:noAutofit/>
         </a:bodyPr>
         <a:lstStyle/>
         <a:p>
-          <a:pPr marL="0" lvl="0" indent="0" algn="ctr" defTabSz="1244600">
+          <a:pPr marL="0" lvl="0" indent="0" algn="ctr" defTabSz="1111250">
             <a:lnSpc>
               <a:spcPct val="90000"/>
             </a:lnSpc>
@@ -10072,15 +9515,15 @@
             <a:buNone/>
           </a:pPr>
           <a:r>
-            <a:rPr lang="nl-BE" sz="2800" kern="1200" dirty="0" err="1"/>
+            <a:rPr lang="nl-BE" sz="2500" kern="1200" dirty="0" err="1"/>
             <a:t>Cons</a:t>
           </a:r>
-          <a:endParaRPr lang="nl-BE" sz="2800" kern="1200" dirty="0"/>
+          <a:endParaRPr lang="nl-BE" sz="2500" kern="1200" dirty="0"/>
         </a:p>
       </dsp:txBody>
       <dsp:txXfrm>
-        <a:off x="5601764" y="43119"/>
-        <a:ext cx="4913783" cy="806400"/>
+        <a:off x="5601764" y="237294"/>
+        <a:ext cx="4913783" cy="720000"/>
       </dsp:txXfrm>
     </dsp:sp>
     <dsp:sp modelId="{A0AC98F3-17E4-4BE5-A378-BA6D3C5FB3F5}">
@@ -10090,8 +9533,8 @@
       </dsp:nvSpPr>
       <dsp:spPr>
         <a:xfrm>
-          <a:off x="5601764" y="849519"/>
-          <a:ext cx="4913783" cy="3458699"/>
+          <a:off x="5601764" y="957294"/>
+          <a:ext cx="4913783" cy="3156750"/>
         </a:xfrm>
         <a:prstGeom prst="rect">
           <a:avLst/>
@@ -10132,12 +9575,12 @@
         <a:fontRef idx="minor"/>
       </dsp:style>
       <dsp:txBody>
-        <a:bodyPr spcFirstLastPara="0" vert="horz" wrap="square" lIns="149352" tIns="149352" rIns="199136" bIns="224028" numCol="1" spcCol="1270" anchor="t" anchorCtr="0">
+        <a:bodyPr spcFirstLastPara="0" vert="horz" wrap="square" lIns="133350" tIns="133350" rIns="177800" bIns="200025" numCol="1" spcCol="1270" anchor="t" anchorCtr="0">
           <a:noAutofit/>
         </a:bodyPr>
         <a:lstStyle/>
         <a:p>
-          <a:pPr marL="285750" lvl="1" indent="-285750" algn="l" defTabSz="1244600">
+          <a:pPr marL="228600" lvl="1" indent="-228600" algn="l" defTabSz="1111250">
             <a:lnSpc>
               <a:spcPct val="90000"/>
             </a:lnSpc>
@@ -10151,13 +9594,13 @@
             <a:buChar char="•"/>
           </a:pPr>
           <a:r>
-            <a:rPr lang="nl-BE" sz="2800" b="0" i="0" kern="1200" dirty="0" err="1"/>
+            <a:rPr lang="nl-BE" sz="2500" b="0" i="0" kern="1200" dirty="0" err="1"/>
             <a:t>Internationalization</a:t>
           </a:r>
-          <a:endParaRPr lang="nl-BE" sz="2800" kern="1200" dirty="0"/>
-        </a:p>
-        <a:p>
-          <a:pPr marL="285750" lvl="1" indent="-285750" algn="l" defTabSz="1244600">
+          <a:endParaRPr lang="nl-BE" sz="2500" kern="1200" dirty="0"/>
+        </a:p>
+        <a:p>
+          <a:pPr marL="228600" lvl="1" indent="-228600" algn="l" defTabSz="1111250">
             <a:lnSpc>
               <a:spcPct val="90000"/>
             </a:lnSpc>
@@ -10171,24 +9614,24 @@
             <a:buChar char="•"/>
           </a:pPr>
           <a:r>
-            <a:rPr lang="nl-BE" sz="2800" b="0" kern="1200" dirty="0" err="1"/>
+            <a:rPr lang="nl-BE" sz="2500" b="0" kern="1200" dirty="0" err="1"/>
             <a:t>paid</a:t>
           </a:r>
           <a:r>
-            <a:rPr lang="nl-BE" sz="2800" b="0" kern="1200" dirty="0"/>
+            <a:rPr lang="nl-BE" sz="2500" b="0" kern="1200" dirty="0"/>
             <a:t> on per-</a:t>
           </a:r>
           <a:r>
-            <a:rPr lang="nl-BE" sz="2800" b="0" kern="1200" dirty="0" err="1"/>
+            <a:rPr lang="nl-BE" sz="2500" b="0" kern="1200" dirty="0" err="1"/>
             <a:t>repository</a:t>
           </a:r>
           <a:r>
-            <a:rPr lang="nl-BE" sz="2800" b="0" kern="1200" dirty="0"/>
+            <a:rPr lang="nl-BE" sz="2500" b="0" kern="1200" dirty="0"/>
             <a:t> basis</a:t>
           </a:r>
         </a:p>
         <a:p>
-          <a:pPr marL="285750" lvl="1" indent="-285750" algn="l" defTabSz="1244600">
+          <a:pPr marL="228600" lvl="1" indent="-228600" algn="l" defTabSz="1111250">
             <a:lnSpc>
               <a:spcPct val="90000"/>
             </a:lnSpc>
@@ -10202,68 +9645,14 @@
             <a:buChar char="•"/>
           </a:pPr>
           <a:r>
-            <a:rPr lang="en-US" sz="2800" kern="1200" dirty="0"/>
+            <a:rPr lang="en-US" sz="2500" kern="1200" dirty="0"/>
             <a:t>Can be expensive (paid version)</a:t>
           </a:r>
         </a:p>
-        <a:p>
-          <a:pPr marL="285750" lvl="1" indent="-285750" algn="l" defTabSz="1244600">
-            <a:lnSpc>
-              <a:spcPct val="90000"/>
-            </a:lnSpc>
-            <a:spcBef>
-              <a:spcPct val="0"/>
-            </a:spcBef>
-            <a:spcAft>
-              <a:spcPct val="15000"/>
-            </a:spcAft>
-            <a:buFont typeface="Arial" panose="020B0604020202020204" pitchFamily="34" charset="0"/>
-            <a:buChar char="•"/>
-          </a:pPr>
-          <a:r>
-            <a:rPr lang="nl-BE" sz="2800" kern="1200" dirty="0" err="1"/>
-            <a:t>Not</a:t>
-          </a:r>
-          <a:r>
-            <a:rPr lang="nl-BE" sz="2800" kern="1200" dirty="0"/>
-            <a:t> easy Quick start</a:t>
-          </a:r>
-        </a:p>
-        <a:p>
-          <a:pPr marL="285750" lvl="1" indent="-285750" algn="l" defTabSz="1244600">
-            <a:lnSpc>
-              <a:spcPct val="90000"/>
-            </a:lnSpc>
-            <a:spcBef>
-              <a:spcPct val="0"/>
-            </a:spcBef>
-            <a:spcAft>
-              <a:spcPct val="15000"/>
-            </a:spcAft>
-            <a:buFont typeface="Arial" panose="020B0604020202020204" pitchFamily="34" charset="0"/>
-            <a:buChar char="•"/>
-          </a:pPr>
-          <a:r>
-            <a:rPr lang="nl-BE" sz="2800" kern="1200" dirty="0" err="1"/>
-            <a:t>GraphQL</a:t>
-          </a:r>
-          <a:r>
-            <a:rPr lang="nl-BE" sz="2800" kern="1200" dirty="0"/>
-            <a:t> voor </a:t>
-          </a:r>
-          <a:r>
-            <a:rPr lang="nl-BE" sz="2800" kern="1200" dirty="0" err="1"/>
-            <a:t>Api</a:t>
-          </a:r>
-          <a:r>
-            <a:rPr lang="nl-BE" sz="2800" kern="1200" dirty="0"/>
-            <a:t> connectie</a:t>
-          </a:r>
-        </a:p>
       </dsp:txBody>
       <dsp:txXfrm>
-        <a:off x="5601764" y="849519"/>
-        <a:ext cx="4913783" cy="3458699"/>
+        <a:off x="5601764" y="957294"/>
+        <a:ext cx="4913783" cy="3156750"/>
       </dsp:txXfrm>
     </dsp:sp>
   </dsp:spTree>
@@ -10796,8 +10185,8 @@
       </dsp:nvSpPr>
       <dsp:spPr>
         <a:xfrm>
-          <a:off x="51" y="28629"/>
-          <a:ext cx="4913783" cy="604800"/>
+          <a:off x="51" y="30429"/>
+          <a:ext cx="4913783" cy="1699200"/>
         </a:xfrm>
         <a:prstGeom prst="rect">
           <a:avLst/>
@@ -10834,12 +10223,12 @@
         </a:fontRef>
       </dsp:style>
       <dsp:txBody>
-        <a:bodyPr spcFirstLastPara="0" vert="horz" wrap="square" lIns="149352" tIns="85344" rIns="149352" bIns="85344" numCol="1" spcCol="1270" anchor="ctr" anchorCtr="0">
+        <a:bodyPr spcFirstLastPara="0" vert="horz" wrap="square" lIns="419608" tIns="239776" rIns="419608" bIns="239776" numCol="1" spcCol="1270" anchor="ctr" anchorCtr="0">
           <a:noAutofit/>
         </a:bodyPr>
         <a:lstStyle/>
         <a:p>
-          <a:pPr marL="0" lvl="0" indent="0" algn="ctr" defTabSz="933450">
+          <a:pPr marL="0" lvl="0" indent="0" algn="ctr" defTabSz="2622550">
             <a:lnSpc>
               <a:spcPct val="90000"/>
             </a:lnSpc>
@@ -10852,14 +10241,14 @@
             <a:buNone/>
           </a:pPr>
           <a:r>
-            <a:rPr lang="nl-BE" sz="2100" kern="1200" dirty="0"/>
+            <a:rPr lang="nl-BE" sz="5900" kern="1200" dirty="0"/>
             <a:t>Pros</a:t>
           </a:r>
         </a:p>
       </dsp:txBody>
       <dsp:txXfrm>
-        <a:off x="51" y="28629"/>
-        <a:ext cx="4913783" cy="604800"/>
+        <a:off x="51" y="30429"/>
+        <a:ext cx="4913783" cy="1699200"/>
       </dsp:txXfrm>
     </dsp:sp>
     <dsp:sp modelId="{C8F60122-0708-422C-8C37-4A4DE14B071D}">
@@ -10869,8 +10258,8 @@
       </dsp:nvSpPr>
       <dsp:spPr>
         <a:xfrm>
-          <a:off x="51" y="633429"/>
-          <a:ext cx="4913783" cy="3689280"/>
+          <a:off x="51" y="1729629"/>
+          <a:ext cx="4913783" cy="2591280"/>
         </a:xfrm>
         <a:prstGeom prst="rect">
           <a:avLst/>
@@ -10914,12 +10303,12 @@
         <a:fontRef idx="minor"/>
       </dsp:style>
       <dsp:txBody>
-        <a:bodyPr spcFirstLastPara="0" vert="horz" wrap="square" lIns="112014" tIns="112014" rIns="149352" bIns="168021" numCol="1" spcCol="1270" anchor="t" anchorCtr="0">
+        <a:bodyPr spcFirstLastPara="0" vert="horz" wrap="square" lIns="149352" tIns="149352" rIns="199136" bIns="224028" numCol="1" spcCol="1270" anchor="t" anchorCtr="0">
           <a:noAutofit/>
         </a:bodyPr>
         <a:lstStyle/>
         <a:p>
-          <a:pPr marL="228600" lvl="1" indent="-228600" algn="l" defTabSz="933450">
+          <a:pPr marL="285750" lvl="1" indent="-285750" algn="l" defTabSz="1244600">
             <a:lnSpc>
               <a:spcPct val="90000"/>
             </a:lnSpc>
@@ -10933,203 +10322,22 @@
             <a:buChar char="•"/>
           </a:pPr>
           <a:r>
-            <a:rPr lang="en-US" sz="2100" kern="1200" dirty="0"/>
-            <a:t>Supports the framework we use</a:t>
-          </a:r>
-          <a:endParaRPr lang="nl-BE" sz="2100" kern="1200" dirty="0"/>
-        </a:p>
-        <a:p>
-          <a:pPr marL="228600" lvl="1" indent="-228600" algn="l" defTabSz="933450">
-            <a:lnSpc>
-              <a:spcPct val="90000"/>
-            </a:lnSpc>
-            <a:spcBef>
-              <a:spcPct val="0"/>
-            </a:spcBef>
-            <a:spcAft>
-              <a:spcPct val="15000"/>
-            </a:spcAft>
-            <a:buFont typeface="Arial" panose="020B0604020202020204" pitchFamily="34" charset="0"/>
-            <a:buChar char="•"/>
-          </a:pPr>
-          <a:r>
-            <a:rPr lang="nl-BE" sz="2100" kern="1200"/>
-            <a:t>Supports AWS hosting</a:t>
-          </a:r>
-        </a:p>
-        <a:p>
-          <a:pPr marL="228600" lvl="1" indent="-228600" algn="l" defTabSz="933450">
-            <a:lnSpc>
-              <a:spcPct val="90000"/>
-            </a:lnSpc>
-            <a:spcBef>
-              <a:spcPct val="0"/>
-            </a:spcBef>
-            <a:spcAft>
-              <a:spcPct val="15000"/>
-            </a:spcAft>
-            <a:buFont typeface="Arial" panose="020B0604020202020204" pitchFamily="34" charset="0"/>
-            <a:buChar char="•"/>
-          </a:pPr>
-          <a:r>
-            <a:rPr lang="nl-BE" sz="2100" kern="1200"/>
-            <a:t>Supports multiple languages</a:t>
-          </a:r>
-        </a:p>
-        <a:p>
-          <a:pPr marL="228600" lvl="1" indent="-228600" algn="l" defTabSz="933450">
-            <a:lnSpc>
-              <a:spcPct val="90000"/>
-            </a:lnSpc>
-            <a:spcBef>
-              <a:spcPct val="0"/>
-            </a:spcBef>
-            <a:spcAft>
-              <a:spcPct val="15000"/>
-            </a:spcAft>
-            <a:buFont typeface="Arial" panose="020B0604020202020204" pitchFamily="34" charset="0"/>
-            <a:buChar char="•"/>
-          </a:pPr>
-          <a:r>
-            <a:rPr lang="nl-BE" sz="2100" kern="1200"/>
-            <a:t>Search Engine Optimiziation</a:t>
-          </a:r>
-        </a:p>
-        <a:p>
-          <a:pPr marL="228600" lvl="1" indent="-228600" algn="l" defTabSz="933450">
-            <a:lnSpc>
-              <a:spcPct val="90000"/>
-            </a:lnSpc>
-            <a:spcBef>
-              <a:spcPct val="0"/>
-            </a:spcBef>
-            <a:spcAft>
-              <a:spcPct val="15000"/>
-            </a:spcAft>
-            <a:buFont typeface="Arial" panose="020B0604020202020204" pitchFamily="34" charset="0"/>
-            <a:buChar char="•"/>
-          </a:pPr>
-          <a:r>
-            <a:rPr lang="nl-BE" sz="2100" kern="1200"/>
-            <a:t>User friendly</a:t>
-          </a:r>
-        </a:p>
-        <a:p>
-          <a:pPr marL="228600" lvl="1" indent="-228600" algn="l" defTabSz="933450">
-            <a:lnSpc>
-              <a:spcPct val="90000"/>
-            </a:lnSpc>
-            <a:spcBef>
-              <a:spcPct val="0"/>
-            </a:spcBef>
-            <a:spcAft>
-              <a:spcPct val="15000"/>
-            </a:spcAft>
-            <a:buFont typeface="Arial" panose="020B0604020202020204" pitchFamily="34" charset="0"/>
-            <a:buChar char="•"/>
-          </a:pPr>
-          <a:r>
-            <a:rPr lang="nl-BE" sz="2100" kern="1200"/>
-            <a:t>Very flexible</a:t>
-          </a:r>
-        </a:p>
-        <a:p>
-          <a:pPr marL="228600" lvl="1" indent="-228600" algn="l" defTabSz="933450">
-            <a:lnSpc>
-              <a:spcPct val="90000"/>
-            </a:lnSpc>
-            <a:spcBef>
-              <a:spcPct val="0"/>
-            </a:spcBef>
-            <a:spcAft>
-              <a:spcPct val="15000"/>
-            </a:spcAft>
-            <a:buFont typeface="Arial" panose="020B0604020202020204" pitchFamily="34" charset="0"/>
-            <a:buChar char="•"/>
-          </a:pPr>
-          <a:r>
-            <a:rPr lang="nl-BE" sz="2100" kern="1200" dirty="0" err="1"/>
-            <a:t>Gets</a:t>
+            <a:rPr lang="nl-BE" sz="2800" kern="1200" dirty="0"/>
+            <a:t>14 </a:t>
           </a:r>
           <a:r>
-            <a:rPr lang="nl-BE" sz="2100" kern="1200" dirty="0"/>
-            <a:t> frequent updates</a:t>
-          </a:r>
-        </a:p>
-        <a:p>
-          <a:pPr marL="228600" lvl="1" indent="-228600" algn="l" defTabSz="933450">
-            <a:lnSpc>
-              <a:spcPct val="90000"/>
-            </a:lnSpc>
-            <a:spcBef>
-              <a:spcPct val="0"/>
-            </a:spcBef>
-            <a:spcAft>
-              <a:spcPct val="15000"/>
-            </a:spcAft>
-            <a:buFont typeface="Arial" panose="020B0604020202020204" pitchFamily="34" charset="0"/>
-            <a:buChar char="•"/>
-          </a:pPr>
-          <a:r>
-            <a:rPr lang="nl-BE" sz="2100" b="0" kern="1200" dirty="0"/>
-            <a:t>Built-in </a:t>
+            <a:rPr lang="nl-BE" sz="2800" kern="1200" dirty="0" err="1"/>
+            <a:t>day</a:t>
           </a:r>
           <a:r>
-            <a:rPr lang="nl-BE" sz="2100" b="0" kern="1200" dirty="0" err="1"/>
-            <a:t>Backups</a:t>
-          </a:r>
-          <a:r>
-            <a:rPr lang="nl-BE" sz="2100" b="0" kern="1200" dirty="0"/>
-            <a:t> &amp; </a:t>
-          </a:r>
-          <a:r>
-            <a:rPr lang="nl-BE" sz="2100" b="0" kern="1200" dirty="0" err="1"/>
-            <a:t>Restore</a:t>
-          </a:r>
-          <a:endParaRPr lang="nl-BE" sz="2100" b="0" kern="1200" dirty="0"/>
-        </a:p>
-        <a:p>
-          <a:pPr marL="228600" lvl="1" indent="-228600" algn="l" defTabSz="933450">
-            <a:lnSpc>
-              <a:spcPct val="90000"/>
-            </a:lnSpc>
-            <a:spcBef>
-              <a:spcPct val="0"/>
-            </a:spcBef>
-            <a:spcAft>
-              <a:spcPct val="15000"/>
-            </a:spcAft>
-            <a:buFont typeface="Arial" panose="020B0604020202020204" pitchFamily="34" charset="0"/>
-            <a:buChar char="•"/>
-          </a:pPr>
-          <a:r>
-            <a:rPr lang="nl-BE" sz="2100" kern="1200"/>
-            <a:t>Plugin marketplace</a:t>
-          </a:r>
-        </a:p>
-        <a:p>
-          <a:pPr marL="228600" lvl="1" indent="-228600" algn="l" defTabSz="933450">
-            <a:lnSpc>
-              <a:spcPct val="90000"/>
-            </a:lnSpc>
-            <a:spcBef>
-              <a:spcPct val="0"/>
-            </a:spcBef>
-            <a:spcAft>
-              <a:spcPct val="15000"/>
-            </a:spcAft>
-            <a:buFont typeface="Arial" panose="020B0604020202020204" pitchFamily="34" charset="0"/>
-            <a:buChar char="•"/>
-          </a:pPr>
-          <a:r>
-            <a:rPr lang="nl-BE" sz="2100" kern="1200" dirty="0"/>
-            <a:t>Easy Quick start</a:t>
+            <a:rPr lang="nl-BE" sz="2800" kern="1200" dirty="0"/>
+            <a:t> free trial</a:t>
           </a:r>
         </a:p>
       </dsp:txBody>
       <dsp:txXfrm>
-        <a:off x="51" y="633429"/>
-        <a:ext cx="4913783" cy="3689280"/>
+        <a:off x="51" y="1729629"/>
+        <a:ext cx="4913783" cy="2591280"/>
       </dsp:txXfrm>
     </dsp:sp>
     <dsp:sp modelId="{EC2DAA9C-4DE0-441E-AFBD-943AB393CFCB}">
@@ -11139,8 +10347,8 @@
       </dsp:nvSpPr>
       <dsp:spPr>
         <a:xfrm>
-          <a:off x="5601764" y="28629"/>
-          <a:ext cx="4913783" cy="604800"/>
+          <a:off x="5601764" y="30429"/>
+          <a:ext cx="4913783" cy="1699200"/>
         </a:xfrm>
         <a:prstGeom prst="rect">
           <a:avLst/>
@@ -11179,12 +10387,12 @@
         </a:fontRef>
       </dsp:style>
       <dsp:txBody>
-        <a:bodyPr spcFirstLastPara="0" vert="horz" wrap="square" lIns="149352" tIns="85344" rIns="149352" bIns="85344" numCol="1" spcCol="1270" anchor="ctr" anchorCtr="0">
+        <a:bodyPr spcFirstLastPara="0" vert="horz" wrap="square" lIns="419608" tIns="239776" rIns="419608" bIns="239776" numCol="1" spcCol="1270" anchor="ctr" anchorCtr="0">
           <a:noAutofit/>
         </a:bodyPr>
         <a:lstStyle/>
         <a:p>
-          <a:pPr marL="0" lvl="0" indent="0" algn="ctr" defTabSz="933450">
+          <a:pPr marL="0" lvl="0" indent="0" algn="ctr" defTabSz="2622550">
             <a:lnSpc>
               <a:spcPct val="90000"/>
             </a:lnSpc>
@@ -11197,15 +10405,15 @@
             <a:buNone/>
           </a:pPr>
           <a:r>
-            <a:rPr lang="nl-BE" sz="2100" kern="1200" dirty="0" err="1"/>
+            <a:rPr lang="nl-BE" sz="5900" kern="1200" dirty="0" err="1"/>
             <a:t>Cons</a:t>
           </a:r>
-          <a:endParaRPr lang="nl-BE" sz="2100" kern="1200" dirty="0"/>
+          <a:endParaRPr lang="nl-BE" sz="5900" kern="1200" dirty="0"/>
         </a:p>
       </dsp:txBody>
       <dsp:txXfrm>
-        <a:off x="5601764" y="28629"/>
-        <a:ext cx="4913783" cy="604800"/>
+        <a:off x="5601764" y="30429"/>
+        <a:ext cx="4913783" cy="1699200"/>
       </dsp:txXfrm>
     </dsp:sp>
     <dsp:sp modelId="{A0AC98F3-17E4-4BE5-A378-BA6D3C5FB3F5}">
@@ -11215,8 +10423,8 @@
       </dsp:nvSpPr>
       <dsp:spPr>
         <a:xfrm>
-          <a:off x="5601764" y="633429"/>
-          <a:ext cx="4913783" cy="3689280"/>
+          <a:off x="5601764" y="1729629"/>
+          <a:ext cx="4913783" cy="2591280"/>
         </a:xfrm>
         <a:prstGeom prst="rect">
           <a:avLst/>
@@ -11257,12 +10465,12 @@
         <a:fontRef idx="minor"/>
       </dsp:style>
       <dsp:txBody>
-        <a:bodyPr spcFirstLastPara="0" vert="horz" wrap="square" lIns="112014" tIns="112014" rIns="149352" bIns="168021" numCol="1" spcCol="1270" anchor="t" anchorCtr="0">
+        <a:bodyPr spcFirstLastPara="0" vert="horz" wrap="square" lIns="149352" tIns="149352" rIns="199136" bIns="224028" numCol="1" spcCol="1270" anchor="t" anchorCtr="0">
           <a:noAutofit/>
         </a:bodyPr>
         <a:lstStyle/>
         <a:p>
-          <a:pPr marL="228600" lvl="1" indent="-228600" algn="l" defTabSz="933450">
+          <a:pPr marL="285750" lvl="1" indent="-285750" algn="l" defTabSz="1244600">
             <a:lnSpc>
               <a:spcPct val="90000"/>
             </a:lnSpc>
@@ -11276,70 +10484,14 @@
             <a:buChar char="•"/>
           </a:pPr>
           <a:r>
-            <a:rPr lang="nl-BE" sz="2100" kern="1200" dirty="0"/>
-            <a:t>Min. 3 </a:t>
+            <a:rPr lang="nl-BE" sz="2800" kern="1200" dirty="0"/>
+            <a:t>Opstart = Betalen</a:t>
           </a:r>
-          <a:r>
-            <a:rPr lang="nl-BE" sz="2100" kern="1200" dirty="0" err="1"/>
-            <a:t>roles</a:t>
-          </a:r>
-          <a:endParaRPr lang="nl-BE" sz="2100" kern="1200" dirty="0"/>
-        </a:p>
-        <a:p>
-          <a:pPr marL="228600" lvl="1" indent="-228600" algn="l" defTabSz="933450">
-            <a:lnSpc>
-              <a:spcPct val="90000"/>
-            </a:lnSpc>
-            <a:spcBef>
-              <a:spcPct val="0"/>
-            </a:spcBef>
-            <a:spcAft>
-              <a:spcPct val="15000"/>
-            </a:spcAft>
-            <a:buFont typeface="Arial" panose="020B0604020202020204" pitchFamily="34" charset="0"/>
-            <a:buChar char="•"/>
-          </a:pPr>
-          <a:r>
-            <a:rPr lang="nl-BE" sz="2100" kern="1200" dirty="0"/>
-            <a:t>via UI (editor)</a:t>
-          </a:r>
-        </a:p>
-        <a:p>
-          <a:pPr marL="228600" lvl="1" indent="-228600" algn="l" defTabSz="933450">
-            <a:lnSpc>
-              <a:spcPct val="90000"/>
-            </a:lnSpc>
-            <a:spcBef>
-              <a:spcPct val="0"/>
-            </a:spcBef>
-            <a:spcAft>
-              <a:spcPct val="15000"/>
-            </a:spcAft>
-            <a:buFont typeface="Arial" panose="020B0604020202020204" pitchFamily="34" charset="0"/>
-            <a:buChar char="•"/>
-          </a:pPr>
-          <a:r>
-            <a:rPr lang="nl-BE" sz="2100" kern="1200" dirty="0"/>
-            <a:t>Weinig </a:t>
-          </a:r>
-          <a:r>
-            <a:rPr lang="nl-BE" sz="2100" kern="1200" dirty="0" err="1"/>
-            <a:t>Plugins</a:t>
-          </a:r>
-          <a:r>
-            <a:rPr lang="nl-BE" sz="2100" kern="1200" dirty="0"/>
-            <a:t> </a:t>
-          </a:r>
-          <a:r>
-            <a:rPr lang="nl-BE" sz="2100" kern="1200" dirty="0" err="1"/>
-            <a:t>marketplace</a:t>
-          </a:r>
-          <a:endParaRPr lang="nl-BE" sz="2100" kern="1200" dirty="0"/>
         </a:p>
       </dsp:txBody>
       <dsp:txXfrm>
-        <a:off x="5601764" y="633429"/>
-        <a:ext cx="4913783" cy="3689280"/>
+        <a:off x="5601764" y="1729629"/>
+        <a:ext cx="4913783" cy="2591280"/>
       </dsp:txXfrm>
     </dsp:sp>
   </dsp:spTree>
@@ -22682,7 +21834,7 @@
             <p:ph idx="1"/>
             <p:extLst>
               <p:ext uri="{D42A27DB-BD31-4B8C-83A1-F6EECF244321}">
-                <p14:modId xmlns:p14="http://schemas.microsoft.com/office/powerpoint/2010/main" val="3661683818"/>
+                <p14:modId xmlns:p14="http://schemas.microsoft.com/office/powerpoint/2010/main" val="3289759628"/>
               </p:ext>
             </p:extLst>
           </p:nvPr>
@@ -22850,13 +22002,8 @@
             <a:pPr algn="ctr"/>
             <a:r>
               <a:rPr lang="nl-BE" dirty="0"/>
-              <a:t>Demo met </a:t>
+              <a:t>Demo</a:t>
             </a:r>
-            <a:r>
-              <a:rPr lang="nl-BE" dirty="0" err="1"/>
-              <a:t>React</a:t>
-            </a:r>
-            <a:endParaRPr lang="nl-BE" dirty="0"/>
           </a:p>
         </p:txBody>
       </p:sp>
@@ -22911,6 +22058,7 @@
           <a:bodyPr/>
           <a:lstStyle/>
           <a:p>
+            <a:pPr algn="ctr"/>
             <a:r>
               <a:rPr lang="nl-BE" dirty="0"/>
               <a:t>Conclusie</a:t>
@@ -22953,10 +22101,65 @@
             </a:r>
           </a:p>
           <a:p>
+            <a:pPr marL="0" indent="0">
+              <a:buNone/>
+            </a:pPr>
             <a:r>
               <a:rPr lang="nl-BE" dirty="0"/>
-              <a:t>Omdat het alle vereisten voldoet en de free versie is,</a:t>
+              <a:t>   Omdat het alle vereisten voldoet en de free versie is.</a:t>
             </a:r>
+          </a:p>
+          <a:p>
+            <a:pPr marL="0" indent="0">
+              <a:buNone/>
+            </a:pPr>
+            <a:endParaRPr lang="nl-BE" dirty="0"/>
+          </a:p>
+          <a:p>
+            <a:r>
+              <a:rPr lang="nl-BE" dirty="0"/>
+              <a:t>Dan zouden we </a:t>
+            </a:r>
+            <a:r>
+              <a:rPr lang="nl-BE" dirty="0" err="1"/>
+              <a:t>contentful</a:t>
+            </a:r>
+            <a:r>
+              <a:rPr lang="nl-BE" dirty="0"/>
+              <a:t> op 2</a:t>
+            </a:r>
+            <a:r>
+              <a:rPr lang="nl-BE" baseline="30000" dirty="0"/>
+              <a:t>de</a:t>
+            </a:r>
+            <a:r>
+              <a:rPr lang="nl-BE" dirty="0"/>
+              <a:t> zetten want het is bijna hetzelfde als </a:t>
+            </a:r>
+            <a:r>
+              <a:rPr lang="nl-BE" dirty="0" err="1"/>
+              <a:t>strapi</a:t>
+            </a:r>
+            <a:r>
+              <a:rPr lang="nl-BE" dirty="0"/>
+              <a:t> met sommige ups en down</a:t>
+            </a:r>
+          </a:p>
+          <a:p>
+            <a:endParaRPr lang="nl-BE" dirty="0"/>
+          </a:p>
+          <a:p>
+            <a:r>
+              <a:rPr lang="nl-BE" dirty="0" err="1"/>
+              <a:t>Prismic</a:t>
+            </a:r>
+            <a:r>
+              <a:rPr lang="nl-BE" dirty="0"/>
+              <a:t> </a:t>
+            </a:r>
+          </a:p>
+          <a:p>
+            <a:endParaRPr lang="nl-BE" dirty="0"/>
           </a:p>
         </p:txBody>
       </p:sp>
@@ -23487,7 +22690,7 @@
             <p:ph idx="1"/>
             <p:extLst>
               <p:ext uri="{D42A27DB-BD31-4B8C-83A1-F6EECF244321}">
-                <p14:modId xmlns:p14="http://schemas.microsoft.com/office/powerpoint/2010/main" val="625156913"/>
+                <p14:modId xmlns:p14="http://schemas.microsoft.com/office/powerpoint/2010/main" val="2251614533"/>
               </p:ext>
             </p:extLst>
           </p:nvPr>
@@ -23607,13 +22810,30 @@
           <a:p>
             <a:r>
               <a:rPr lang="nl-BE" dirty="0"/>
-              <a:t>Teveel </a:t>
+              <a:t>Best Overall </a:t>
             </a:r>
             <a:r>
               <a:rPr lang="nl-BE" dirty="0" err="1"/>
-              <a:t>cons</a:t>
+              <a:t>paid</a:t>
             </a:r>
             <a:endParaRPr lang="nl-BE" dirty="0"/>
+          </a:p>
+          <a:p>
+            <a:endParaRPr lang="nl-BE" dirty="0"/>
+          </a:p>
+          <a:p>
+            <a:r>
+              <a:rPr lang="nl-BE" dirty="0"/>
+              <a:t>Veel </a:t>
+            </a:r>
+            <a:r>
+              <a:rPr lang="nl-BE" dirty="0" err="1"/>
+              <a:t>locked</a:t>
+            </a:r>
+            <a:r>
+              <a:rPr lang="nl-BE" dirty="0"/>
+              <a:t> achter betaling</a:t>
+            </a:r>
           </a:p>
           <a:p>
             <a:endParaRPr lang="nl-BE" dirty="0"/>
@@ -23763,7 +22983,7 @@
           <a:p>
             <a:r>
               <a:rPr lang="nl-BE" dirty="0" err="1"/>
-              <a:t>KeystoneJs</a:t>
+              <a:t>KeystoneJS</a:t>
             </a:r>
             <a:endParaRPr lang="nl-BE" dirty="0"/>
           </a:p>

</xml_diff>